<commit_message>
Added some more changes.
</commit_message>
<xml_diff>
--- a/Docs/Chatboard Build 1.pptx
+++ b/Docs/Chatboard Build 1.pptx
@@ -18,7 +18,9 @@
     <p:sldId id="266" r:id="rId12"/>
     <p:sldId id="267" r:id="rId13"/>
     <p:sldId id="268" r:id="rId14"/>
-    <p:sldId id="269" r:id="rId15"/>
+    <p:sldId id="270" r:id="rId15"/>
+    <p:sldId id="271" r:id="rId16"/>
+    <p:sldId id="269" r:id="rId17"/>
   </p:sldIdLst>
   <p:sldSz cx="9144000" cy="6858000" type="screen4x3"/>
   <p:notesSz cx="6858000" cy="9144000"/>
@@ -250,7 +252,8 @@
           <a:p>
             <a:fld id="{BC9B90E9-1097-5647-8C1A-163DCC3676F6}" type="datetimeFigureOut">
               <a:rPr lang="en-US" smtClean="0"/>
-              <a:t>10/13/09</a:t>
+              <a:pPr/>
+              <a:t>10/14/09</a:t>
             </a:fld>
             <a:endParaRPr lang="en-US"/>
           </a:p>
@@ -292,6 +295,7 @@
           <a:p>
             <a:fld id="{55A79BEE-1C7D-2341-8536-65DF47B990A4}" type="slidenum">
               <a:rPr lang="en-US" smtClean="0"/>
+              <a:pPr/>
               <a:t>‹#›</a:t>
             </a:fld>
             <a:endParaRPr lang="en-US"/>
@@ -549,7 +553,8 @@
           <a:p>
             <a:fld id="{BC9B90E9-1097-5647-8C1A-163DCC3676F6}" type="datetimeFigureOut">
               <a:rPr lang="en-US" smtClean="0"/>
-              <a:t>10/13/09</a:t>
+              <a:pPr/>
+              <a:t>10/14/09</a:t>
             </a:fld>
             <a:endParaRPr lang="en-US"/>
           </a:p>
@@ -591,6 +596,7 @@
           <a:p>
             <a:fld id="{55A79BEE-1C7D-2341-8536-65DF47B990A4}" type="slidenum">
               <a:rPr lang="en-US" smtClean="0"/>
+              <a:pPr/>
               <a:t>‹#›</a:t>
             </a:fld>
             <a:endParaRPr lang="en-US"/>
@@ -724,7 +730,8 @@
           <a:p>
             <a:fld id="{BC9B90E9-1097-5647-8C1A-163DCC3676F6}" type="datetimeFigureOut">
               <a:rPr lang="en-US" smtClean="0"/>
-              <a:t>10/13/09</a:t>
+              <a:pPr/>
+              <a:t>10/14/09</a:t>
             </a:fld>
             <a:endParaRPr lang="en-US"/>
           </a:p>
@@ -766,6 +773,7 @@
           <a:p>
             <a:fld id="{55A79BEE-1C7D-2341-8536-65DF47B990A4}" type="slidenum">
               <a:rPr lang="en-US" smtClean="0"/>
+              <a:pPr/>
               <a:t>‹#›</a:t>
             </a:fld>
             <a:endParaRPr lang="en-US"/>
@@ -889,7 +897,8 @@
           <a:p>
             <a:fld id="{BC9B90E9-1097-5647-8C1A-163DCC3676F6}" type="datetimeFigureOut">
               <a:rPr lang="en-US" smtClean="0"/>
-              <a:t>10/13/09</a:t>
+              <a:pPr/>
+              <a:t>10/14/09</a:t>
             </a:fld>
             <a:endParaRPr lang="en-US"/>
           </a:p>
@@ -931,6 +940,7 @@
           <a:p>
             <a:fld id="{55A79BEE-1C7D-2341-8536-65DF47B990A4}" type="slidenum">
               <a:rPr lang="en-US" smtClean="0"/>
+              <a:pPr/>
               <a:t>‹#›</a:t>
             </a:fld>
             <a:endParaRPr lang="en-US"/>
@@ -1147,7 +1157,8 @@
           <a:p>
             <a:fld id="{BC9B90E9-1097-5647-8C1A-163DCC3676F6}" type="datetimeFigureOut">
               <a:rPr lang="en-US" smtClean="0"/>
-              <a:t>10/13/09</a:t>
+              <a:pPr/>
+              <a:t>10/14/09</a:t>
             </a:fld>
             <a:endParaRPr lang="en-US"/>
           </a:p>
@@ -1189,6 +1200,7 @@
           <a:p>
             <a:fld id="{55A79BEE-1C7D-2341-8536-65DF47B990A4}" type="slidenum">
               <a:rPr lang="en-US" smtClean="0"/>
+              <a:pPr/>
               <a:t>‹#›</a:t>
             </a:fld>
             <a:endParaRPr lang="en-US"/>
@@ -1599,7 +1611,8 @@
           <a:p>
             <a:fld id="{BC9B90E9-1097-5647-8C1A-163DCC3676F6}" type="datetimeFigureOut">
               <a:rPr lang="en-US" smtClean="0"/>
-              <a:t>10/13/09</a:t>
+              <a:pPr/>
+              <a:t>10/14/09</a:t>
             </a:fld>
             <a:endParaRPr lang="en-US"/>
           </a:p>
@@ -1641,6 +1654,7 @@
           <a:p>
             <a:fld id="{55A79BEE-1C7D-2341-8536-65DF47B990A4}" type="slidenum">
               <a:rPr lang="en-US" smtClean="0"/>
+              <a:pPr/>
               <a:t>‹#›</a:t>
             </a:fld>
             <a:endParaRPr lang="en-US"/>
@@ -2077,7 +2091,8 @@
           <a:p>
             <a:fld id="{BC9B90E9-1097-5647-8C1A-163DCC3676F6}" type="datetimeFigureOut">
               <a:rPr lang="en-US" smtClean="0"/>
-              <a:t>10/13/09</a:t>
+              <a:pPr/>
+              <a:t>10/14/09</a:t>
             </a:fld>
             <a:endParaRPr lang="en-US"/>
           </a:p>
@@ -2119,6 +2134,7 @@
           <a:p>
             <a:fld id="{55A79BEE-1C7D-2341-8536-65DF47B990A4}" type="slidenum">
               <a:rPr lang="en-US" smtClean="0"/>
+              <a:pPr/>
               <a:t>‹#›</a:t>
             </a:fld>
             <a:endParaRPr lang="en-US"/>
@@ -2195,7 +2211,8 @@
           <a:p>
             <a:fld id="{BC9B90E9-1097-5647-8C1A-163DCC3676F6}" type="datetimeFigureOut">
               <a:rPr lang="en-US" smtClean="0"/>
-              <a:t>10/13/09</a:t>
+              <a:pPr/>
+              <a:t>10/14/09</a:t>
             </a:fld>
             <a:endParaRPr lang="en-US"/>
           </a:p>
@@ -2237,6 +2254,7 @@
           <a:p>
             <a:fld id="{55A79BEE-1C7D-2341-8536-65DF47B990A4}" type="slidenum">
               <a:rPr lang="en-US" smtClean="0"/>
+              <a:pPr/>
               <a:t>‹#›</a:t>
             </a:fld>
             <a:endParaRPr lang="en-US"/>
@@ -2331,7 +2349,8 @@
           <a:p>
             <a:fld id="{BC9B90E9-1097-5647-8C1A-163DCC3676F6}" type="datetimeFigureOut">
               <a:rPr lang="en-US" smtClean="0"/>
-              <a:t>10/13/09</a:t>
+              <a:pPr/>
+              <a:t>10/14/09</a:t>
             </a:fld>
             <a:endParaRPr lang="en-US"/>
           </a:p>
@@ -2373,6 +2392,7 @@
           <a:p>
             <a:fld id="{55A79BEE-1C7D-2341-8536-65DF47B990A4}" type="slidenum">
               <a:rPr lang="en-US" smtClean="0"/>
+              <a:pPr/>
               <a:t>‹#›</a:t>
             </a:fld>
             <a:endParaRPr lang="en-US"/>
@@ -2642,7 +2662,8 @@
           <a:p>
             <a:fld id="{BC9B90E9-1097-5647-8C1A-163DCC3676F6}" type="datetimeFigureOut">
               <a:rPr lang="en-US" smtClean="0"/>
-              <a:t>10/13/09</a:t>
+              <a:pPr/>
+              <a:t>10/14/09</a:t>
             </a:fld>
             <a:endParaRPr lang="en-US"/>
           </a:p>
@@ -2684,6 +2705,7 @@
           <a:p>
             <a:fld id="{55A79BEE-1C7D-2341-8536-65DF47B990A4}" type="slidenum">
               <a:rPr lang="en-US" smtClean="0"/>
+              <a:pPr/>
               <a:t>‹#›</a:t>
             </a:fld>
             <a:endParaRPr lang="en-US"/>
@@ -2769,7 +2791,8 @@
           <a:p>
             <a:fld id="{BC9B90E9-1097-5647-8C1A-163DCC3676F6}" type="datetimeFigureOut">
               <a:rPr lang="en-US" smtClean="0"/>
-              <a:t>10/13/09</a:t>
+              <a:pPr/>
+              <a:t>10/14/09</a:t>
             </a:fld>
             <a:endParaRPr lang="en-US"/>
           </a:p>
@@ -2811,6 +2834,7 @@
           <a:p>
             <a:fld id="{55A79BEE-1C7D-2341-8536-65DF47B990A4}" type="slidenum">
               <a:rPr lang="en-US" smtClean="0"/>
+              <a:pPr/>
               <a:t>‹#›</a:t>
             </a:fld>
             <a:endParaRPr lang="en-US"/>
@@ -3525,7 +3549,8 @@
           <a:p>
             <a:fld id="{BC9B90E9-1097-5647-8C1A-163DCC3676F6}" type="datetimeFigureOut">
               <a:rPr lang="en-US" smtClean="0"/>
-              <a:t>10/13/09</a:t>
+              <a:pPr/>
+              <a:t>10/14/09</a:t>
             </a:fld>
             <a:endParaRPr lang="en-US"/>
           </a:p>
@@ -3607,6 +3632,7 @@
           <a:p>
             <a:fld id="{55A79BEE-1C7D-2341-8536-65DF47B990A4}" type="slidenum">
               <a:rPr lang="en-US" smtClean="0"/>
+              <a:pPr/>
               <a:t>‹#›</a:t>
             </a:fld>
             <a:endParaRPr lang="en-US"/>
@@ -4429,7 +4455,15 @@
           <a:p>
             <a:r>
               <a:rPr lang="en-US" dirty="0" smtClean="0"/>
-              <a:t>No development blog/twitter at the moment</a:t>
+              <a:t>No development blog/</a:t>
+            </a:r>
+            <a:r>
+              <a:rPr lang="en-US" dirty="0" smtClean="0"/>
+              <a:t>twitter/wiki </a:t>
+            </a:r>
+            <a:r>
+              <a:rPr lang="en-US" dirty="0" smtClean="0"/>
+              <a:t>at the moment</a:t>
             </a:r>
           </a:p>
           <a:p>
@@ -4469,6 +4503,210 @@
       </p:grpSpPr>
       <p:sp>
         <p:nvSpPr>
+          <p:cNvPr id="2" name="Title 1"/>
+          <p:cNvSpPr>
+            <a:spLocks noGrp="1"/>
+          </p:cNvSpPr>
+          <p:nvPr>
+            <p:ph type="title"/>
+          </p:nvPr>
+        </p:nvSpPr>
+        <p:spPr/>
+        <p:txBody>
+          <a:bodyPr/>
+          <a:lstStyle/>
+          <a:p>
+            <a:r>
+              <a:rPr lang="en-US" dirty="0" smtClean="0"/>
+              <a:t>Blocks and problems</a:t>
+            </a:r>
+            <a:endParaRPr lang="en-US" dirty="0"/>
+          </a:p>
+        </p:txBody>
+      </p:sp>
+      <p:sp>
+        <p:nvSpPr>
+          <p:cNvPr id="3" name="Content Placeholder 2"/>
+          <p:cNvSpPr>
+            <a:spLocks noGrp="1"/>
+          </p:cNvSpPr>
+          <p:nvPr>
+            <p:ph idx="1"/>
+          </p:nvPr>
+        </p:nvSpPr>
+        <p:spPr/>
+        <p:txBody>
+          <a:bodyPr/>
+          <a:lstStyle/>
+          <a:p>
+            <a:r>
+              <a:rPr lang="en-US" dirty="0" smtClean="0"/>
+              <a:t>Whiteboard as expected biggest issue</a:t>
+            </a:r>
+          </a:p>
+          <a:p>
+            <a:r>
+              <a:rPr lang="en-US" dirty="0" smtClean="0"/>
+              <a:t>Originally, multiprotocol IM was to be an add on</a:t>
+            </a:r>
+          </a:p>
+          <a:p>
+            <a:r>
+              <a:rPr lang="en-US" dirty="0" smtClean="0"/>
+              <a:t>Evolved into IM being most important section, Whiteboard as subsection</a:t>
+            </a:r>
+          </a:p>
+          <a:p>
+            <a:r>
+              <a:rPr lang="en-US" dirty="0" smtClean="0"/>
+              <a:t>Installing </a:t>
+            </a:r>
+            <a:r>
+              <a:rPr lang="en-US" dirty="0" err="1" smtClean="0"/>
+              <a:t>Openfire</a:t>
+            </a:r>
+            <a:endParaRPr lang="en-US" dirty="0" smtClean="0"/>
+          </a:p>
+          <a:p>
+            <a:r>
+              <a:rPr lang="en-US" dirty="0" smtClean="0"/>
+              <a:t>Learning Factory in Java</a:t>
+            </a:r>
+            <a:endParaRPr lang="en-US" dirty="0"/>
+          </a:p>
+        </p:txBody>
+      </p:sp>
+    </p:spTree>
+  </p:cSld>
+  <p:clrMapOvr>
+    <a:masterClrMapping/>
+  </p:clrMapOvr>
+</p:sld>
+</file>
+
+<file path=ppt/slides/slide15.xml><?xml version="1.0" encoding="utf-8"?>
+<p:sld xmlns:a="http://schemas.openxmlformats.org/drawingml/2006/main" xmlns:r="http://schemas.openxmlformats.org/officeDocument/2006/relationships" xmlns:mc="http://schemas.openxmlformats.org/markup-compatibility/2006" xmlns:mv="urn:schemas-microsoft-com:mac:vml" xmlns:p="http://schemas.openxmlformats.org/presentationml/2006/main" mc:Ignorable="mv" mc:PreserveAttributes="mv:*">
+  <p:cSld>
+    <p:spTree>
+      <p:nvGrpSpPr>
+        <p:cNvPr id="1" name=""/>
+        <p:cNvGrpSpPr/>
+        <p:nvPr/>
+      </p:nvGrpSpPr>
+      <p:grpSpPr>
+        <a:xfrm>
+          <a:off x="0" y="0"/>
+          <a:ext cx="0" cy="0"/>
+          <a:chOff x="0" y="0"/>
+          <a:chExt cx="0" cy="0"/>
+        </a:xfrm>
+      </p:grpSpPr>
+      <p:sp>
+        <p:nvSpPr>
+          <p:cNvPr id="2" name="Title 1"/>
+          <p:cNvSpPr>
+            <a:spLocks noGrp="1"/>
+          </p:cNvSpPr>
+          <p:nvPr>
+            <p:ph type="title"/>
+          </p:nvPr>
+        </p:nvSpPr>
+        <p:spPr/>
+        <p:txBody>
+          <a:bodyPr/>
+          <a:lstStyle/>
+          <a:p>
+            <a:r>
+              <a:rPr lang="en-US" dirty="0" smtClean="0"/>
+              <a:t>Next steps</a:t>
+            </a:r>
+            <a:endParaRPr lang="en-US" dirty="0"/>
+          </a:p>
+        </p:txBody>
+      </p:sp>
+      <p:sp>
+        <p:nvSpPr>
+          <p:cNvPr id="3" name="Content Placeholder 2"/>
+          <p:cNvSpPr>
+            <a:spLocks noGrp="1"/>
+          </p:cNvSpPr>
+          <p:nvPr>
+            <p:ph idx="1"/>
+          </p:nvPr>
+        </p:nvSpPr>
+        <p:spPr/>
+        <p:txBody>
+          <a:bodyPr/>
+          <a:lstStyle/>
+          <a:p>
+            <a:r>
+              <a:rPr lang="en-US" dirty="0" smtClean="0"/>
+              <a:t>Finalize multiprotocol IM’s</a:t>
+            </a:r>
+          </a:p>
+          <a:p>
+            <a:r>
+              <a:rPr lang="en-US" dirty="0" smtClean="0"/>
+              <a:t>Demo of whiteboard</a:t>
+            </a:r>
+          </a:p>
+          <a:p>
+            <a:r>
+              <a:rPr lang="en-US" dirty="0" smtClean="0"/>
+              <a:t>Whiteboard integration</a:t>
+            </a:r>
+          </a:p>
+          <a:p>
+            <a:r>
+              <a:rPr lang="en-US" dirty="0" smtClean="0"/>
+              <a:t>Finish </a:t>
+            </a:r>
+            <a:r>
+              <a:rPr lang="en-US" dirty="0" err="1" smtClean="0"/>
+              <a:t>gui</a:t>
+            </a:r>
+            <a:endParaRPr lang="en-US" dirty="0" smtClean="0"/>
+          </a:p>
+          <a:p>
+            <a:r>
+              <a:rPr lang="en-US" dirty="0" smtClean="0"/>
+              <a:t>Figure out how to pass </a:t>
+            </a:r>
+            <a:r>
+              <a:rPr lang="en-US" smtClean="0"/>
+              <a:t>whiteboard about</a:t>
+            </a:r>
+            <a:endParaRPr lang="en-US"/>
+          </a:p>
+        </p:txBody>
+      </p:sp>
+    </p:spTree>
+  </p:cSld>
+  <p:clrMapOvr>
+    <a:masterClrMapping/>
+  </p:clrMapOvr>
+</p:sld>
+</file>
+
+<file path=ppt/slides/slide16.xml><?xml version="1.0" encoding="utf-8"?>
+<p:sld xmlns:a="http://schemas.openxmlformats.org/drawingml/2006/main" xmlns:r="http://schemas.openxmlformats.org/officeDocument/2006/relationships" xmlns:mc="http://schemas.openxmlformats.org/markup-compatibility/2006" xmlns:mv="urn:schemas-microsoft-com:mac:vml" xmlns:p="http://schemas.openxmlformats.org/presentationml/2006/main" mc:Ignorable="mv" mc:PreserveAttributes="mv:*">
+  <p:cSld>
+    <p:spTree>
+      <p:nvGrpSpPr>
+        <p:cNvPr id="1" name=""/>
+        <p:cNvGrpSpPr/>
+        <p:nvPr/>
+      </p:nvGrpSpPr>
+      <p:grpSpPr>
+        <a:xfrm>
+          <a:off x="0" y="0"/>
+          <a:ext cx="0" cy="0"/>
+          <a:chOff x="0" y="0"/>
+          <a:chExt cx="0" cy="0"/>
+        </a:xfrm>
+      </p:grpSpPr>
+      <p:sp>
+        <p:nvSpPr>
           <p:cNvPr id="4" name="Title 3"/>
           <p:cNvSpPr>
             <a:spLocks noGrp="1"/>
@@ -4714,10 +4952,23 @@
             </a:r>
           </a:p>
           <a:p>
-            <a:r>
-              <a:rPr lang="en-US" dirty="0" smtClean="0"/>
-              <a:t>Java based</a:t>
-            </a:r>
+            <a:pPr lvl="1"/>
+            <a:r>
+              <a:rPr lang="en-US" dirty="0" smtClean="0"/>
+              <a:t>Java </a:t>
+            </a:r>
+            <a:r>
+              <a:rPr lang="en-US" dirty="0" smtClean="0"/>
+              <a:t>based</a:t>
+            </a:r>
+          </a:p>
+          <a:p>
+            <a:pPr lvl="1"/>
+            <a:r>
+              <a:rPr lang="en-US" dirty="0" smtClean="0"/>
+              <a:t>Metaphors</a:t>
+            </a:r>
+            <a:endParaRPr lang="en-US" dirty="0" smtClean="0"/>
           </a:p>
         </p:txBody>
       </p:sp>

</xml_diff>

<commit_message>
committing the powerpoint changes
</commit_message>
<xml_diff>
--- a/Docs/Chatboard Build 1.pptx
+++ b/Docs/Chatboard Build 1.pptx
@@ -1,6 +1,6 @@
 
 <file path=ppt/presentation.xml><?xml version="1.0" encoding="utf-8"?>
-<p:presentation xmlns:a="http://schemas.openxmlformats.org/drawingml/2006/main" xmlns:r="http://schemas.openxmlformats.org/officeDocument/2006/relationships" xmlns:mc="http://schemas.openxmlformats.org/markup-compatibility/2006" xmlns:mv="urn:schemas-microsoft-com:mac:vml" xmlns:p="http://schemas.openxmlformats.org/presentationml/2006/main" mc:Ignorable="mv" mc:PreserveAttributes="mv:*" saveSubsetFonts="1" autoCompressPictures="0">
+<p:presentation xmlns:a="http://schemas.openxmlformats.org/drawingml/2006/main" xmlns:r="http://schemas.openxmlformats.org/officeDocument/2006/relationships" xmlns:p="http://schemas.openxmlformats.org/presentationml/2006/main" serverZoom="9073" saveSubsetFonts="1" autoCompressPictures="0">
   <p:sldMasterIdLst>
     <p:sldMasterId id="2147483660" r:id="rId1"/>
   </p:sldMasterIdLst>
@@ -16,9 +16,12 @@
     <p:sldId id="264" r:id="rId10"/>
     <p:sldId id="265" r:id="rId11"/>
     <p:sldId id="266" r:id="rId12"/>
-    <p:sldId id="267" r:id="rId13"/>
-    <p:sldId id="268" r:id="rId14"/>
-    <p:sldId id="269" r:id="rId15"/>
+    <p:sldId id="270" r:id="rId13"/>
+    <p:sldId id="271" r:id="rId14"/>
+    <p:sldId id="272" r:id="rId15"/>
+    <p:sldId id="267" r:id="rId16"/>
+    <p:sldId id="268" r:id="rId17"/>
+    <p:sldId id="269" r:id="rId18"/>
   </p:sldIdLst>
   <p:sldSz cx="9144000" cy="6858000" type="screen4x3"/>
   <p:notesSz cx="6858000" cy="9144000"/>
@@ -121,7 +124,7 @@
 </file>
 
 <file path=ppt/slideLayouts/slideLayout1.xml><?xml version="1.0" encoding="utf-8"?>
-<p:sldLayout xmlns:a="http://schemas.openxmlformats.org/drawingml/2006/main" xmlns:r="http://schemas.openxmlformats.org/officeDocument/2006/relationships" xmlns:mc="http://schemas.openxmlformats.org/markup-compatibility/2006" xmlns:mv="urn:schemas-microsoft-com:mac:vml" xmlns:p="http://schemas.openxmlformats.org/presentationml/2006/main" mc:Ignorable="mv" mc:PreserveAttributes="mv:*" type="title" preserve="1">
+<p:sldLayout xmlns:a="http://schemas.openxmlformats.org/drawingml/2006/main" xmlns:r="http://schemas.openxmlformats.org/officeDocument/2006/relationships" xmlns:p="http://schemas.openxmlformats.org/presentationml/2006/main" type="title" preserve="1">
   <p:cSld name="Title Slide">
     <p:spTree>
       <p:nvGrpSpPr>
@@ -250,7 +253,8 @@
           <a:p>
             <a:fld id="{BC9B90E9-1097-5647-8C1A-163DCC3676F6}" type="datetimeFigureOut">
               <a:rPr lang="en-US" smtClean="0"/>
-              <a:t>10/13/09</a:t>
+              <a:pPr/>
+              <a:t>10/14/2009</a:t>
             </a:fld>
             <a:endParaRPr lang="en-US"/>
           </a:p>
@@ -292,6 +296,7 @@
           <a:p>
             <a:fld id="{55A79BEE-1C7D-2341-8536-65DF47B990A4}" type="slidenum">
               <a:rPr lang="en-US" smtClean="0"/>
+              <a:pPr/>
               <a:t>‹#›</a:t>
             </a:fld>
             <a:endParaRPr lang="en-US"/>
@@ -441,7 +446,7 @@
 </file>
 
 <file path=ppt/slideLayouts/slideLayout10.xml><?xml version="1.0" encoding="utf-8"?>
-<p:sldLayout xmlns:a="http://schemas.openxmlformats.org/drawingml/2006/main" xmlns:r="http://schemas.openxmlformats.org/officeDocument/2006/relationships" xmlns:mc="http://schemas.openxmlformats.org/markup-compatibility/2006" xmlns:mv="urn:schemas-microsoft-com:mac:vml" xmlns:p="http://schemas.openxmlformats.org/presentationml/2006/main" mc:Ignorable="mv" mc:PreserveAttributes="mv:*" type="vertTx" preserve="1">
+<p:sldLayout xmlns:a="http://schemas.openxmlformats.org/drawingml/2006/main" xmlns:r="http://schemas.openxmlformats.org/officeDocument/2006/relationships" xmlns:p="http://schemas.openxmlformats.org/presentationml/2006/main" type="vertTx" preserve="1">
   <p:cSld name="Title and Vertical Text">
     <p:spTree>
       <p:nvGrpSpPr>
@@ -549,7 +554,8 @@
           <a:p>
             <a:fld id="{BC9B90E9-1097-5647-8C1A-163DCC3676F6}" type="datetimeFigureOut">
               <a:rPr lang="en-US" smtClean="0"/>
-              <a:t>10/13/09</a:t>
+              <a:pPr/>
+              <a:t>10/14/2009</a:t>
             </a:fld>
             <a:endParaRPr lang="en-US"/>
           </a:p>
@@ -591,6 +597,7 @@
           <a:p>
             <a:fld id="{55A79BEE-1C7D-2341-8536-65DF47B990A4}" type="slidenum">
               <a:rPr lang="en-US" smtClean="0"/>
+              <a:pPr/>
               <a:t>‹#›</a:t>
             </a:fld>
             <a:endParaRPr lang="en-US"/>
@@ -606,7 +613,7 @@
 </file>
 
 <file path=ppt/slideLayouts/slideLayout11.xml><?xml version="1.0" encoding="utf-8"?>
-<p:sldLayout xmlns:a="http://schemas.openxmlformats.org/drawingml/2006/main" xmlns:r="http://schemas.openxmlformats.org/officeDocument/2006/relationships" xmlns:mc="http://schemas.openxmlformats.org/markup-compatibility/2006" xmlns:mv="urn:schemas-microsoft-com:mac:vml" xmlns:p="http://schemas.openxmlformats.org/presentationml/2006/main" mc:Ignorable="mv" mc:PreserveAttributes="mv:*" type="vertTitleAndTx" preserve="1">
+<p:sldLayout xmlns:a="http://schemas.openxmlformats.org/drawingml/2006/main" xmlns:r="http://schemas.openxmlformats.org/officeDocument/2006/relationships" xmlns:p="http://schemas.openxmlformats.org/presentationml/2006/main" type="vertTitleAndTx" preserve="1">
   <p:cSld name="Vertical Title and Text">
     <p:spTree>
       <p:nvGrpSpPr>
@@ -724,7 +731,8 @@
           <a:p>
             <a:fld id="{BC9B90E9-1097-5647-8C1A-163DCC3676F6}" type="datetimeFigureOut">
               <a:rPr lang="en-US" smtClean="0"/>
-              <a:t>10/13/09</a:t>
+              <a:pPr/>
+              <a:t>10/14/2009</a:t>
             </a:fld>
             <a:endParaRPr lang="en-US"/>
           </a:p>
@@ -766,6 +774,7 @@
           <a:p>
             <a:fld id="{55A79BEE-1C7D-2341-8536-65DF47B990A4}" type="slidenum">
               <a:rPr lang="en-US" smtClean="0"/>
+              <a:pPr/>
               <a:t>‹#›</a:t>
             </a:fld>
             <a:endParaRPr lang="en-US"/>
@@ -781,7 +790,7 @@
 </file>
 
 <file path=ppt/slideLayouts/slideLayout2.xml><?xml version="1.0" encoding="utf-8"?>
-<p:sldLayout xmlns:a="http://schemas.openxmlformats.org/drawingml/2006/main" xmlns:r="http://schemas.openxmlformats.org/officeDocument/2006/relationships" xmlns:mc="http://schemas.openxmlformats.org/markup-compatibility/2006" xmlns:mv="urn:schemas-microsoft-com:mac:vml" xmlns:p="http://schemas.openxmlformats.org/presentationml/2006/main" mc:Ignorable="mv" mc:PreserveAttributes="mv:*" type="obj" preserve="1">
+<p:sldLayout xmlns:a="http://schemas.openxmlformats.org/drawingml/2006/main" xmlns:r="http://schemas.openxmlformats.org/officeDocument/2006/relationships" xmlns:p="http://schemas.openxmlformats.org/presentationml/2006/main" type="obj" preserve="1">
   <p:cSld name="Title and Content">
     <p:spTree>
       <p:nvGrpSpPr>
@@ -889,7 +898,8 @@
           <a:p>
             <a:fld id="{BC9B90E9-1097-5647-8C1A-163DCC3676F6}" type="datetimeFigureOut">
               <a:rPr lang="en-US" smtClean="0"/>
-              <a:t>10/13/09</a:t>
+              <a:pPr/>
+              <a:t>10/14/2009</a:t>
             </a:fld>
             <a:endParaRPr lang="en-US"/>
           </a:p>
@@ -931,6 +941,7 @@
           <a:p>
             <a:fld id="{55A79BEE-1C7D-2341-8536-65DF47B990A4}" type="slidenum">
               <a:rPr lang="en-US" smtClean="0"/>
+              <a:pPr/>
               <a:t>‹#›</a:t>
             </a:fld>
             <a:endParaRPr lang="en-US"/>
@@ -946,7 +957,7 @@
 </file>
 
 <file path=ppt/slideLayouts/slideLayout3.xml><?xml version="1.0" encoding="utf-8"?>
-<p:sldLayout xmlns:a="http://schemas.openxmlformats.org/drawingml/2006/main" xmlns:r="http://schemas.openxmlformats.org/officeDocument/2006/relationships" xmlns:mc="http://schemas.openxmlformats.org/markup-compatibility/2006" xmlns:mv="urn:schemas-microsoft-com:mac:vml" xmlns:p="http://schemas.openxmlformats.org/presentationml/2006/main" mc:Ignorable="mv" mc:PreserveAttributes="mv:*" showMasterSp="0" type="secHead" preserve="1">
+<p:sldLayout xmlns:a="http://schemas.openxmlformats.org/drawingml/2006/main" xmlns:r="http://schemas.openxmlformats.org/officeDocument/2006/relationships" xmlns:p="http://schemas.openxmlformats.org/presentationml/2006/main" showMasterSp="0" type="secHead" preserve="1">
   <p:cSld name="Section Header">
     <p:spTree>
       <p:nvGrpSpPr>
@@ -1147,7 +1158,8 @@
           <a:p>
             <a:fld id="{BC9B90E9-1097-5647-8C1A-163DCC3676F6}" type="datetimeFigureOut">
               <a:rPr lang="en-US" smtClean="0"/>
-              <a:t>10/13/09</a:t>
+              <a:pPr/>
+              <a:t>10/14/2009</a:t>
             </a:fld>
             <a:endParaRPr lang="en-US"/>
           </a:p>
@@ -1189,6 +1201,7 @@
           <a:p>
             <a:fld id="{55A79BEE-1C7D-2341-8536-65DF47B990A4}" type="slidenum">
               <a:rPr lang="en-US" smtClean="0"/>
+              <a:pPr/>
               <a:t>‹#›</a:t>
             </a:fld>
             <a:endParaRPr lang="en-US"/>
@@ -1392,7 +1405,7 @@
 </file>
 
 <file path=ppt/slideLayouts/slideLayout4.xml><?xml version="1.0" encoding="utf-8"?>
-<p:sldLayout xmlns:a="http://schemas.openxmlformats.org/drawingml/2006/main" xmlns:r="http://schemas.openxmlformats.org/officeDocument/2006/relationships" xmlns:mc="http://schemas.openxmlformats.org/markup-compatibility/2006" xmlns:mv="urn:schemas-microsoft-com:mac:vml" xmlns:p="http://schemas.openxmlformats.org/presentationml/2006/main" mc:Ignorable="mv" mc:PreserveAttributes="mv:*" type="twoObj" preserve="1">
+<p:sldLayout xmlns:a="http://schemas.openxmlformats.org/drawingml/2006/main" xmlns:r="http://schemas.openxmlformats.org/officeDocument/2006/relationships" xmlns:p="http://schemas.openxmlformats.org/presentationml/2006/main" type="twoObj" preserve="1">
   <p:cSld name="Two Content">
     <p:spTree>
       <p:nvGrpSpPr>
@@ -1599,7 +1612,8 @@
           <a:p>
             <a:fld id="{BC9B90E9-1097-5647-8C1A-163DCC3676F6}" type="datetimeFigureOut">
               <a:rPr lang="en-US" smtClean="0"/>
-              <a:t>10/13/09</a:t>
+              <a:pPr/>
+              <a:t>10/14/2009</a:t>
             </a:fld>
             <a:endParaRPr lang="en-US"/>
           </a:p>
@@ -1641,6 +1655,7 @@
           <a:p>
             <a:fld id="{55A79BEE-1C7D-2341-8536-65DF47B990A4}" type="slidenum">
               <a:rPr lang="en-US" smtClean="0"/>
+              <a:pPr/>
               <a:t>‹#›</a:t>
             </a:fld>
             <a:endParaRPr lang="en-US"/>
@@ -1656,7 +1671,7 @@
 </file>
 
 <file path=ppt/slideLayouts/slideLayout5.xml><?xml version="1.0" encoding="utf-8"?>
-<p:sldLayout xmlns:a="http://schemas.openxmlformats.org/drawingml/2006/main" xmlns:r="http://schemas.openxmlformats.org/officeDocument/2006/relationships" xmlns:mc="http://schemas.openxmlformats.org/markup-compatibility/2006" xmlns:mv="urn:schemas-microsoft-com:mac:vml" xmlns:p="http://schemas.openxmlformats.org/presentationml/2006/main" mc:Ignorable="mv" mc:PreserveAttributes="mv:*" showMasterSp="0" type="twoTxTwoObj" preserve="1">
+<p:sldLayout xmlns:a="http://schemas.openxmlformats.org/drawingml/2006/main" xmlns:r="http://schemas.openxmlformats.org/officeDocument/2006/relationships" xmlns:p="http://schemas.openxmlformats.org/presentationml/2006/main" showMasterSp="0" type="twoTxTwoObj" preserve="1">
   <p:cSld name="Comparison">
     <p:spTree>
       <p:nvGrpSpPr>
@@ -2077,7 +2092,8 @@
           <a:p>
             <a:fld id="{BC9B90E9-1097-5647-8C1A-163DCC3676F6}" type="datetimeFigureOut">
               <a:rPr lang="en-US" smtClean="0"/>
-              <a:t>10/13/09</a:t>
+              <a:pPr/>
+              <a:t>10/14/2009</a:t>
             </a:fld>
             <a:endParaRPr lang="en-US"/>
           </a:p>
@@ -2119,6 +2135,7 @@
           <a:p>
             <a:fld id="{55A79BEE-1C7D-2341-8536-65DF47B990A4}" type="slidenum">
               <a:rPr lang="en-US" smtClean="0"/>
+              <a:pPr/>
               <a:t>‹#›</a:t>
             </a:fld>
             <a:endParaRPr lang="en-US"/>
@@ -2134,7 +2151,7 @@
 </file>
 
 <file path=ppt/slideLayouts/slideLayout6.xml><?xml version="1.0" encoding="utf-8"?>
-<p:sldLayout xmlns:a="http://schemas.openxmlformats.org/drawingml/2006/main" xmlns:r="http://schemas.openxmlformats.org/officeDocument/2006/relationships" xmlns:mc="http://schemas.openxmlformats.org/markup-compatibility/2006" xmlns:mv="urn:schemas-microsoft-com:mac:vml" xmlns:p="http://schemas.openxmlformats.org/presentationml/2006/main" mc:Ignorable="mv" mc:PreserveAttributes="mv:*" type="titleOnly" preserve="1">
+<p:sldLayout xmlns:a="http://schemas.openxmlformats.org/drawingml/2006/main" xmlns:r="http://schemas.openxmlformats.org/officeDocument/2006/relationships" xmlns:p="http://schemas.openxmlformats.org/presentationml/2006/main" type="titleOnly" preserve="1">
   <p:cSld name="Title Only">
     <p:spTree>
       <p:nvGrpSpPr>
@@ -2195,7 +2212,8 @@
           <a:p>
             <a:fld id="{BC9B90E9-1097-5647-8C1A-163DCC3676F6}" type="datetimeFigureOut">
               <a:rPr lang="en-US" smtClean="0"/>
-              <a:t>10/13/09</a:t>
+              <a:pPr/>
+              <a:t>10/14/2009</a:t>
             </a:fld>
             <a:endParaRPr lang="en-US"/>
           </a:p>
@@ -2237,6 +2255,7 @@
           <a:p>
             <a:fld id="{55A79BEE-1C7D-2341-8536-65DF47B990A4}" type="slidenum">
               <a:rPr lang="en-US" smtClean="0"/>
+              <a:pPr/>
               <a:t>‹#›</a:t>
             </a:fld>
             <a:endParaRPr lang="en-US"/>
@@ -2252,7 +2271,7 @@
 </file>
 
 <file path=ppt/slideLayouts/slideLayout7.xml><?xml version="1.0" encoding="utf-8"?>
-<p:sldLayout xmlns:a="http://schemas.openxmlformats.org/drawingml/2006/main" xmlns:r="http://schemas.openxmlformats.org/officeDocument/2006/relationships" xmlns:mc="http://schemas.openxmlformats.org/markup-compatibility/2006" xmlns:mv="urn:schemas-microsoft-com:mac:vml" xmlns:p="http://schemas.openxmlformats.org/presentationml/2006/main" mc:Ignorable="mv" mc:PreserveAttributes="mv:*" showMasterSp="0" type="blank" preserve="1">
+<p:sldLayout xmlns:a="http://schemas.openxmlformats.org/drawingml/2006/main" xmlns:r="http://schemas.openxmlformats.org/officeDocument/2006/relationships" xmlns:p="http://schemas.openxmlformats.org/presentationml/2006/main" showMasterSp="0" type="blank" preserve="1">
   <p:cSld name="Blank">
     <p:spTree>
       <p:nvGrpSpPr>
@@ -2331,7 +2350,8 @@
           <a:p>
             <a:fld id="{BC9B90E9-1097-5647-8C1A-163DCC3676F6}" type="datetimeFigureOut">
               <a:rPr lang="en-US" smtClean="0"/>
-              <a:t>10/13/09</a:t>
+              <a:pPr/>
+              <a:t>10/14/2009</a:t>
             </a:fld>
             <a:endParaRPr lang="en-US"/>
           </a:p>
@@ -2373,6 +2393,7 @@
           <a:p>
             <a:fld id="{55A79BEE-1C7D-2341-8536-65DF47B990A4}" type="slidenum">
               <a:rPr lang="en-US" smtClean="0"/>
+              <a:pPr/>
               <a:t>‹#›</a:t>
             </a:fld>
             <a:endParaRPr lang="en-US"/>
@@ -2442,7 +2463,7 @@
 </file>
 
 <file path=ppt/slideLayouts/slideLayout8.xml><?xml version="1.0" encoding="utf-8"?>
-<p:sldLayout xmlns:a="http://schemas.openxmlformats.org/drawingml/2006/main" xmlns:r="http://schemas.openxmlformats.org/officeDocument/2006/relationships" xmlns:mc="http://schemas.openxmlformats.org/markup-compatibility/2006" xmlns:mv="urn:schemas-microsoft-com:mac:vml" xmlns:p="http://schemas.openxmlformats.org/presentationml/2006/main" mc:Ignorable="mv" mc:PreserveAttributes="mv:*" showMasterSp="0" type="objTx" preserve="1">
+<p:sldLayout xmlns:a="http://schemas.openxmlformats.org/drawingml/2006/main" xmlns:r="http://schemas.openxmlformats.org/officeDocument/2006/relationships" xmlns:p="http://schemas.openxmlformats.org/presentationml/2006/main" showMasterSp="0" type="objTx" preserve="1">
   <p:cSld name="Content with Caption">
     <p:spTree>
       <p:nvGrpSpPr>
@@ -2642,7 +2663,8 @@
           <a:p>
             <a:fld id="{BC9B90E9-1097-5647-8C1A-163DCC3676F6}" type="datetimeFigureOut">
               <a:rPr lang="en-US" smtClean="0"/>
-              <a:t>10/13/09</a:t>
+              <a:pPr/>
+              <a:t>10/14/2009</a:t>
             </a:fld>
             <a:endParaRPr lang="en-US"/>
           </a:p>
@@ -2684,6 +2706,7 @@
           <a:p>
             <a:fld id="{55A79BEE-1C7D-2341-8536-65DF47B990A4}" type="slidenum">
               <a:rPr lang="en-US" smtClean="0"/>
+              <a:pPr/>
               <a:t>‹#›</a:t>
             </a:fld>
             <a:endParaRPr lang="en-US"/>
@@ -2699,7 +2722,7 @@
 </file>
 
 <file path=ppt/slideLayouts/slideLayout9.xml><?xml version="1.0" encoding="utf-8"?>
-<p:sldLayout xmlns:a="http://schemas.openxmlformats.org/drawingml/2006/main" xmlns:r="http://schemas.openxmlformats.org/officeDocument/2006/relationships" xmlns:mc="http://schemas.openxmlformats.org/markup-compatibility/2006" xmlns:mv="urn:schemas-microsoft-com:mac:vml" xmlns:p="http://schemas.openxmlformats.org/presentationml/2006/main" mc:Ignorable="mv" mc:PreserveAttributes="mv:*" showMasterSp="0" type="picTx" preserve="1">
+<p:sldLayout xmlns:a="http://schemas.openxmlformats.org/drawingml/2006/main" xmlns:r="http://schemas.openxmlformats.org/officeDocument/2006/relationships" xmlns:p="http://schemas.openxmlformats.org/presentationml/2006/main" showMasterSp="0" type="picTx" preserve="1">
   <p:cSld name="Picture with Caption">
     <p:spTree>
       <p:nvGrpSpPr>
@@ -2769,7 +2792,8 @@
           <a:p>
             <a:fld id="{BC9B90E9-1097-5647-8C1A-163DCC3676F6}" type="datetimeFigureOut">
               <a:rPr lang="en-US" smtClean="0"/>
-              <a:t>10/13/09</a:t>
+              <a:pPr/>
+              <a:t>10/14/2009</a:t>
             </a:fld>
             <a:endParaRPr lang="en-US"/>
           </a:p>
@@ -2811,6 +2835,7 @@
           <a:p>
             <a:fld id="{55A79BEE-1C7D-2341-8536-65DF47B990A4}" type="slidenum">
               <a:rPr lang="en-US" smtClean="0"/>
+              <a:pPr/>
               <a:t>‹#›</a:t>
             </a:fld>
             <a:endParaRPr lang="en-US"/>
@@ -3120,7 +3145,7 @@
 </file>
 
 <file path=ppt/slideMasters/slideMaster1.xml><?xml version="1.0" encoding="utf-8"?>
-<p:sldMaster xmlns:a="http://schemas.openxmlformats.org/drawingml/2006/main" xmlns:r="http://schemas.openxmlformats.org/officeDocument/2006/relationships" xmlns:mc="http://schemas.openxmlformats.org/markup-compatibility/2006" xmlns:mv="urn:schemas-microsoft-com:mac:vml" xmlns:p="http://schemas.openxmlformats.org/presentationml/2006/main" mc:Ignorable="mv" mc:PreserveAttributes="mv:*">
+<p:sldMaster xmlns:a="http://schemas.openxmlformats.org/drawingml/2006/main" xmlns:r="http://schemas.openxmlformats.org/officeDocument/2006/relationships" xmlns:p="http://schemas.openxmlformats.org/presentationml/2006/main">
   <p:cSld>
     <p:bg>
       <p:bgRef idx="1003">
@@ -3525,7 +3550,8 @@
           <a:p>
             <a:fld id="{BC9B90E9-1097-5647-8C1A-163DCC3676F6}" type="datetimeFigureOut">
               <a:rPr lang="en-US" smtClean="0"/>
-              <a:t>10/13/09</a:t>
+              <a:pPr/>
+              <a:t>10/14/2009</a:t>
             </a:fld>
             <a:endParaRPr lang="en-US"/>
           </a:p>
@@ -3607,6 +3633,7 @@
           <a:p>
             <a:fld id="{55A79BEE-1C7D-2341-8536-65DF47B990A4}" type="slidenum">
               <a:rPr lang="en-US" smtClean="0"/>
+              <a:pPr/>
               <a:t>‹#›</a:t>
             </a:fld>
             <a:endParaRPr lang="en-US"/>
@@ -3998,7 +4025,7 @@
 </file>
 
 <file path=ppt/slides/slide1.xml><?xml version="1.0" encoding="utf-8"?>
-<p:sld xmlns:a="http://schemas.openxmlformats.org/drawingml/2006/main" xmlns:r="http://schemas.openxmlformats.org/officeDocument/2006/relationships" xmlns:mc="http://schemas.openxmlformats.org/markup-compatibility/2006" xmlns:mv="urn:schemas-microsoft-com:mac:vml" xmlns:p="http://schemas.openxmlformats.org/presentationml/2006/main" mc:Ignorable="mv" mc:PreserveAttributes="mv:*">
+<p:sld xmlns:a="http://schemas.openxmlformats.org/drawingml/2006/main" xmlns:r="http://schemas.openxmlformats.org/officeDocument/2006/relationships" xmlns:p="http://schemas.openxmlformats.org/presentationml/2006/main">
   <p:cSld>
     <p:spTree>
       <p:nvGrpSpPr>
@@ -4118,7 +4145,7 @@
 </file>
 
 <file path=ppt/slides/slide10.xml><?xml version="1.0" encoding="utf-8"?>
-<p:sld xmlns:a="http://schemas.openxmlformats.org/drawingml/2006/main" xmlns:r="http://schemas.openxmlformats.org/officeDocument/2006/relationships" xmlns:mc="http://schemas.openxmlformats.org/markup-compatibility/2006" xmlns:mv="urn:schemas-microsoft-com:mac:vml" xmlns:p="http://schemas.openxmlformats.org/presentationml/2006/main" mc:Ignorable="mv" mc:PreserveAttributes="mv:*">
+<p:sld xmlns:a="http://schemas.openxmlformats.org/drawingml/2006/main" xmlns:r="http://schemas.openxmlformats.org/officeDocument/2006/relationships" xmlns:p="http://schemas.openxmlformats.org/presentationml/2006/main">
   <p:cSld>
     <p:spTree>
       <p:nvGrpSpPr>
@@ -4193,7 +4220,7 @@
 </file>
 
 <file path=ppt/slides/slide11.xml><?xml version="1.0" encoding="utf-8"?>
-<p:sld xmlns:a="http://schemas.openxmlformats.org/drawingml/2006/main" xmlns:r="http://schemas.openxmlformats.org/officeDocument/2006/relationships" xmlns:mc="http://schemas.openxmlformats.org/markup-compatibility/2006" xmlns:mv="urn:schemas-microsoft-com:mac:vml" xmlns:p="http://schemas.openxmlformats.org/presentationml/2006/main" mc:Ignorable="mv" mc:PreserveAttributes="mv:*">
+<p:sld xmlns:a="http://schemas.openxmlformats.org/drawingml/2006/main" xmlns:r="http://schemas.openxmlformats.org/officeDocument/2006/relationships" xmlns:p="http://schemas.openxmlformats.org/presentationml/2006/main">
   <p:cSld>
     <p:spTree>
       <p:nvGrpSpPr>
@@ -4264,7 +4291,7 @@
 </file>
 
 <file path=ppt/slides/slide12.xml><?xml version="1.0" encoding="utf-8"?>
-<p:sld xmlns:a="http://schemas.openxmlformats.org/drawingml/2006/main" xmlns:r="http://schemas.openxmlformats.org/officeDocument/2006/relationships" xmlns:mc="http://schemas.openxmlformats.org/markup-compatibility/2006" xmlns:mv="urn:schemas-microsoft-com:mac:vml" xmlns:p="http://schemas.openxmlformats.org/presentationml/2006/main" mc:Ignorable="mv" mc:PreserveAttributes="mv:*">
+<p:sld xmlns:a="http://schemas.openxmlformats.org/drawingml/2006/main" xmlns:r="http://schemas.openxmlformats.org/officeDocument/2006/relationships" xmlns:p="http://schemas.openxmlformats.org/presentationml/2006/main">
   <p:cSld>
     <p:spTree>
       <p:nvGrpSpPr>
@@ -4282,7 +4309,7 @@
       </p:grpSpPr>
       <p:sp>
         <p:nvSpPr>
-          <p:cNvPr id="2" name="Title 1"/>
+          <p:cNvPr id="4" name="Title 3"/>
           <p:cNvSpPr>
             <a:spLocks noGrp="1"/>
           </p:cNvSpPr>
@@ -4292,12 +4319,14 @@
         </p:nvSpPr>
         <p:spPr/>
         <p:txBody>
-          <a:bodyPr/>
-          <a:lstStyle/>
-          <a:p>
-            <a:r>
-              <a:rPr lang="en-US" dirty="0" smtClean="0"/>
-              <a:t>Infrastructure</a:t>
+          <a:bodyPr>
+            <a:normAutofit/>
+          </a:bodyPr>
+          <a:lstStyle/>
+          <a:p>
+            <a:r>
+              <a:rPr lang="en-US" dirty="0" smtClean="0"/>
+              <a:t>GUI – Swing	</a:t>
             </a:r>
             <a:endParaRPr lang="en-US" dirty="0"/>
           </a:p>
@@ -4310,19 +4339,33 @@
             <a:spLocks noGrp="1"/>
           </p:cNvSpPr>
           <p:nvPr>
-            <p:ph type="body" idx="1"/>
-          </p:nvPr>
-        </p:nvSpPr>
-        <p:spPr/>
-        <p:txBody>
-          <a:bodyPr/>
-          <a:lstStyle/>
-          <a:p>
-            <a:r>
-              <a:rPr lang="en-US" dirty="0" smtClean="0"/>
-              <a:t>Wrapping up</a:t>
-            </a:r>
-            <a:endParaRPr lang="en-US" dirty="0"/>
+            <p:ph idx="1"/>
+          </p:nvPr>
+        </p:nvSpPr>
+        <p:spPr/>
+        <p:txBody>
+          <a:bodyPr/>
+          <a:lstStyle/>
+          <a:p>
+            <a:r>
+              <a:rPr lang="en-US" dirty="0" smtClean="0"/>
+              <a:t>Using Swing, as it is the best supported GUI architecture for Java</a:t>
+            </a:r>
+          </a:p>
+          <a:p>
+            <a:pPr lvl="1"/>
+            <a:r>
+              <a:rPr lang="en-US" dirty="0" smtClean="0"/>
+              <a:t>Not AWT because Swing will keep our look and feel consistent across all Operating Systems.</a:t>
+            </a:r>
+            <a:endParaRPr lang="en-US" dirty="0" smtClean="0"/>
+          </a:p>
+          <a:p>
+            <a:pPr lvl="1"/>
+            <a:r>
+              <a:rPr lang="en-US" dirty="0" smtClean="0"/>
+              <a:t>Also, can easily modify the look and feel by plugging in a different L&amp;F from the internet.</a:t>
+            </a:r>
           </a:p>
         </p:txBody>
       </p:sp>
@@ -4335,7 +4378,7 @@
 </file>
 
 <file path=ppt/slides/slide13.xml><?xml version="1.0" encoding="utf-8"?>
-<p:sld xmlns:a="http://schemas.openxmlformats.org/drawingml/2006/main" xmlns:r="http://schemas.openxmlformats.org/officeDocument/2006/relationships" xmlns:mc="http://schemas.openxmlformats.org/markup-compatibility/2006" xmlns:mv="urn:schemas-microsoft-com:mac:vml" xmlns:p="http://schemas.openxmlformats.org/presentationml/2006/main" mc:Ignorable="mv" mc:PreserveAttributes="mv:*">
+<p:sld xmlns:a="http://schemas.openxmlformats.org/drawingml/2006/main" xmlns:r="http://schemas.openxmlformats.org/officeDocument/2006/relationships" xmlns:p="http://schemas.openxmlformats.org/presentationml/2006/main">
   <p:cSld>
     <p:spTree>
       <p:nvGrpSpPr>
@@ -4353,7 +4396,7 @@
       </p:grpSpPr>
       <p:sp>
         <p:nvSpPr>
-          <p:cNvPr id="4" name="Title 3"/>
+          <p:cNvPr id="2" name="Title 1"/>
           <p:cNvSpPr>
             <a:spLocks noGrp="1"/>
           </p:cNvSpPr>
@@ -4368,7 +4411,7 @@
           <a:p>
             <a:r>
               <a:rPr lang="en-US" dirty="0" smtClean="0"/>
-              <a:t>Infrastructure</a:t>
+              <a:t>Reusability	</a:t>
             </a:r>
             <a:endParaRPr lang="en-US" dirty="0"/>
           </a:p>
@@ -4376,7 +4419,7 @@
       </p:sp>
       <p:sp>
         <p:nvSpPr>
-          <p:cNvPr id="5" name="Content Placeholder 4"/>
+          <p:cNvPr id="3" name="Content Placeholder 2"/>
           <p:cNvSpPr>
             <a:spLocks noGrp="1"/>
           </p:cNvSpPr>
@@ -4390,53 +4433,20 @@
           <a:lstStyle/>
           <a:p>
             <a:r>
-              <a:rPr lang="en-US" dirty="0" err="1" smtClean="0"/>
-              <a:t>Github</a:t>
-            </a:r>
-            <a:r>
-              <a:rPr lang="en-US" dirty="0" smtClean="0"/>
-              <a:t> for version control</a:t>
-            </a:r>
-          </a:p>
-          <a:p>
-            <a:r>
-              <a:rPr lang="en-US" dirty="0" smtClean="0"/>
-              <a:t>Eclipse for development</a:t>
-            </a:r>
-          </a:p>
-          <a:p>
-            <a:r>
-              <a:rPr lang="en-US" dirty="0" smtClean="0"/>
-              <a:t>UNIX server for hosting our </a:t>
-            </a:r>
-            <a:r>
-              <a:rPr lang="en-US" dirty="0" err="1" smtClean="0"/>
-              <a:t>openfire</a:t>
-            </a:r>
-            <a:endParaRPr lang="en-US" dirty="0" smtClean="0"/>
-          </a:p>
-          <a:p>
-            <a:r>
-              <a:rPr lang="en-US" dirty="0" smtClean="0"/>
-              <a:t>Ticketing and Bug fixes </a:t>
-            </a:r>
-            <a:r>
-              <a:rPr lang="en-US" dirty="0" err="1" smtClean="0"/>
-              <a:t>tbd</a:t>
-            </a:r>
-            <a:endParaRPr lang="en-US" dirty="0" smtClean="0"/>
-          </a:p>
-          <a:p>
-            <a:r>
-              <a:rPr lang="en-US" dirty="0" smtClean="0"/>
-              <a:t>No development blog/twitter at the moment</a:t>
-            </a:r>
-          </a:p>
-          <a:p>
-            <a:pPr lvl="1"/>
-            <a:r>
-              <a:rPr lang="en-US" dirty="0" smtClean="0"/>
-              <a:t>Project for Fall break</a:t>
+              <a:rPr lang="en-US" dirty="0" smtClean="0"/>
+              <a:t>One common occurrence in a GUI is that many windows will use similar functions and features, such as an OK or Cancel button</a:t>
+            </a:r>
+          </a:p>
+          <a:p>
+            <a:r>
+              <a:rPr lang="en-US" dirty="0" smtClean="0"/>
+              <a:t>Can handle this common code by making an abstract base window class that implements these common features</a:t>
+            </a:r>
+          </a:p>
+          <a:p>
+            <a:r>
+              <a:rPr lang="en-US" dirty="0" smtClean="0"/>
+              <a:t>How to use this abstract class in a smart way?</a:t>
             </a:r>
             <a:endParaRPr lang="en-US" dirty="0"/>
           </a:p>
@@ -4451,7 +4461,7 @@
 </file>
 
 <file path=ppt/slides/slide14.xml><?xml version="1.0" encoding="utf-8"?>
-<p:sld xmlns:a="http://schemas.openxmlformats.org/drawingml/2006/main" xmlns:r="http://schemas.openxmlformats.org/officeDocument/2006/relationships" xmlns:mc="http://schemas.openxmlformats.org/markup-compatibility/2006" xmlns:mv="urn:schemas-microsoft-com:mac:vml" xmlns:p="http://schemas.openxmlformats.org/presentationml/2006/main" mc:Ignorable="mv" mc:PreserveAttributes="mv:*">
+<p:sld xmlns:a="http://schemas.openxmlformats.org/drawingml/2006/main" xmlns:r="http://schemas.openxmlformats.org/officeDocument/2006/relationships" xmlns:p="http://schemas.openxmlformats.org/presentationml/2006/main">
   <p:cSld>
     <p:spTree>
       <p:nvGrpSpPr>
@@ -4469,7 +4479,7 @@
       </p:grpSpPr>
       <p:sp>
         <p:nvSpPr>
-          <p:cNvPr id="4" name="Title 3"/>
+          <p:cNvPr id="2" name="Title 1"/>
           <p:cNvSpPr>
             <a:spLocks noGrp="1"/>
           </p:cNvSpPr>
@@ -4483,10 +4493,51 @@
           <a:lstStyle/>
           <a:p>
             <a:r>
-              <a:rPr lang="en-US" smtClean="0"/>
-              <a:t>QUESTIONS</a:t>
-            </a:r>
-            <a:endParaRPr lang="en-US"/>
+              <a:rPr lang="en-US" dirty="0" smtClean="0"/>
+              <a:t>Factories	</a:t>
+            </a:r>
+            <a:endParaRPr lang="en-US" dirty="0"/>
+          </a:p>
+        </p:txBody>
+      </p:sp>
+      <p:sp>
+        <p:nvSpPr>
+          <p:cNvPr id="3" name="Content Placeholder 2"/>
+          <p:cNvSpPr>
+            <a:spLocks noGrp="1"/>
+          </p:cNvSpPr>
+          <p:nvPr>
+            <p:ph idx="1"/>
+          </p:nvPr>
+        </p:nvSpPr>
+        <p:spPr/>
+        <p:txBody>
+          <a:bodyPr/>
+          <a:lstStyle/>
+          <a:p>
+            <a:r>
+              <a:rPr lang="en-US" dirty="0" smtClean="0"/>
+              <a:t>Can use a factory to create all the subclasses of the abstract base class in an automated fashion.</a:t>
+            </a:r>
+          </a:p>
+          <a:p>
+            <a:r>
+              <a:rPr lang="en-US" dirty="0" smtClean="0"/>
+              <a:t>Doing this allows easy reuse of code.</a:t>
+            </a:r>
+          </a:p>
+          <a:p>
+            <a:r>
+              <a:rPr lang="en-US" dirty="0" smtClean="0"/>
+              <a:t>It also encapsulates the code nicely.</a:t>
+            </a:r>
+          </a:p>
+          <a:p>
+            <a:r>
+              <a:rPr lang="en-US" dirty="0" smtClean="0"/>
+              <a:t>An enumeration also allows for easy hookups of menu code.</a:t>
+            </a:r>
+            <a:endParaRPr lang="en-US" dirty="0"/>
           </a:p>
         </p:txBody>
       </p:sp>
@@ -4498,8 +4549,8 @@
 </p:sld>
 </file>
 
-<file path=ppt/slides/slide2.xml><?xml version="1.0" encoding="utf-8"?>
-<p:sld xmlns:a="http://schemas.openxmlformats.org/drawingml/2006/main" xmlns:r="http://schemas.openxmlformats.org/officeDocument/2006/relationships" xmlns:mc="http://schemas.openxmlformats.org/markup-compatibility/2006" xmlns:mv="urn:schemas-microsoft-com:mac:vml" xmlns:p="http://schemas.openxmlformats.org/presentationml/2006/main" mc:Ignorable="mv" mc:PreserveAttributes="mv:*">
+<file path=ppt/slides/slide15.xml><?xml version="1.0" encoding="utf-8"?>
+<p:sld xmlns:a="http://schemas.openxmlformats.org/drawingml/2006/main" xmlns:r="http://schemas.openxmlformats.org/officeDocument/2006/relationships" xmlns:p="http://schemas.openxmlformats.org/presentationml/2006/main">
   <p:cSld>
     <p:spTree>
       <p:nvGrpSpPr>
@@ -4532,7 +4583,7 @@
           <a:p>
             <a:r>
               <a:rPr lang="en-US" dirty="0" smtClean="0"/>
-              <a:t>Background</a:t>
+              <a:t>Infrastructure</a:t>
             </a:r>
             <a:endParaRPr lang="en-US" dirty="0"/>
           </a:p>
@@ -4540,83 +4591,23 @@
       </p:sp>
       <p:sp>
         <p:nvSpPr>
-          <p:cNvPr id="3" name="Content Placeholder 2"/>
-          <p:cNvSpPr>
-            <a:spLocks noGrp="1"/>
-          </p:cNvSpPr>
-          <p:nvPr>
-            <p:ph idx="1"/>
-          </p:nvPr>
-        </p:nvSpPr>
-        <p:spPr/>
-        <p:txBody>
-          <a:bodyPr/>
-          <a:lstStyle/>
-          <a:p>
-            <a:r>
-              <a:rPr lang="en-US" dirty="0" smtClean="0"/>
-              <a:t>Many Multiprotocol IM’s</a:t>
-            </a:r>
-          </a:p>
-          <a:p>
-            <a:pPr lvl="1"/>
-            <a:r>
-              <a:rPr lang="en-US" dirty="0" smtClean="0"/>
-              <a:t>Similar to </a:t>
-            </a:r>
-            <a:r>
-              <a:rPr lang="en-US" dirty="0" err="1" smtClean="0"/>
-              <a:t>Digsby</a:t>
-            </a:r>
-            <a:endParaRPr lang="en-US" dirty="0" smtClean="0"/>
-          </a:p>
-          <a:p>
-            <a:pPr lvl="1"/>
-            <a:r>
-              <a:rPr lang="en-US" dirty="0" err="1" smtClean="0"/>
-              <a:t>Adium</a:t>
-            </a:r>
-            <a:r>
-              <a:rPr lang="en-US" dirty="0" smtClean="0"/>
-              <a:t> for </a:t>
-            </a:r>
-            <a:r>
-              <a:rPr lang="en-US" dirty="0" err="1" smtClean="0"/>
-              <a:t>mac</a:t>
-            </a:r>
-            <a:endParaRPr lang="en-US" dirty="0" smtClean="0"/>
-          </a:p>
-          <a:p>
-            <a:r>
-              <a:rPr lang="en-US" dirty="0" smtClean="0"/>
-              <a:t>Many whiteboards</a:t>
-            </a:r>
-          </a:p>
-          <a:p>
-            <a:pPr lvl="1"/>
-            <a:r>
-              <a:rPr lang="en-US" dirty="0" smtClean="0"/>
-              <a:t>Microsoft live meeting</a:t>
-            </a:r>
-          </a:p>
-          <a:p>
-            <a:pPr lvl="1"/>
-            <a:r>
-              <a:rPr lang="en-US" dirty="0" smtClean="0"/>
-              <a:t>Popular as a live action tool</a:t>
-            </a:r>
-          </a:p>
-          <a:p>
-            <a:pPr lvl="2"/>
-            <a:r>
-              <a:rPr lang="en-US" dirty="0" smtClean="0"/>
-              <a:t>Especially as students in computer science/engineering</a:t>
-            </a:r>
-          </a:p>
-          <a:p>
-            <a:endParaRPr lang="en-US" dirty="0" smtClean="0"/>
-          </a:p>
-          <a:p>
+          <p:cNvPr id="3" name="Text Placeholder 2"/>
+          <p:cNvSpPr>
+            <a:spLocks noGrp="1"/>
+          </p:cNvSpPr>
+          <p:nvPr>
+            <p:ph type="body" idx="1"/>
+          </p:nvPr>
+        </p:nvSpPr>
+        <p:spPr/>
+        <p:txBody>
+          <a:bodyPr/>
+          <a:lstStyle/>
+          <a:p>
+            <a:r>
+              <a:rPr lang="en-US" dirty="0" smtClean="0"/>
+              <a:t>Wrapping up</a:t>
+            </a:r>
             <a:endParaRPr lang="en-US" dirty="0"/>
           </a:p>
         </p:txBody>
@@ -4629,8 +4620,8 @@
 </p:sld>
 </file>
 
-<file path=ppt/slides/slide3.xml><?xml version="1.0" encoding="utf-8"?>
-<p:sld xmlns:a="http://schemas.openxmlformats.org/drawingml/2006/main" xmlns:r="http://schemas.openxmlformats.org/officeDocument/2006/relationships" xmlns:mc="http://schemas.openxmlformats.org/markup-compatibility/2006" xmlns:mv="urn:schemas-microsoft-com:mac:vml" xmlns:p="http://schemas.openxmlformats.org/presentationml/2006/main" mc:Ignorable="mv" mc:PreserveAttributes="mv:*">
+<file path=ppt/slides/slide16.xml><?xml version="1.0" encoding="utf-8"?>
+<p:sld xmlns:a="http://schemas.openxmlformats.org/drawingml/2006/main" xmlns:r="http://schemas.openxmlformats.org/officeDocument/2006/relationships" xmlns:p="http://schemas.openxmlformats.org/presentationml/2006/main">
   <p:cSld>
     <p:spTree>
       <p:nvGrpSpPr>
@@ -4648,7 +4639,7 @@
       </p:grpSpPr>
       <p:sp>
         <p:nvSpPr>
-          <p:cNvPr id="2" name="Title 1"/>
+          <p:cNvPr id="4" name="Title 3"/>
           <p:cNvSpPr>
             <a:spLocks noGrp="1"/>
           </p:cNvSpPr>
@@ -4663,7 +4654,7 @@
           <a:p>
             <a:r>
               <a:rPr lang="en-US" dirty="0" smtClean="0"/>
-              <a:t>Conception</a:t>
+              <a:t>Infrastructure</a:t>
             </a:r>
             <a:endParaRPr lang="en-US" dirty="0"/>
           </a:p>
@@ -4671,7 +4662,7 @@
       </p:sp>
       <p:sp>
         <p:nvSpPr>
-          <p:cNvPr id="3" name="Content Placeholder 2"/>
+          <p:cNvPr id="5" name="Content Placeholder 4"/>
           <p:cNvSpPr>
             <a:spLocks noGrp="1"/>
           </p:cNvSpPr>
@@ -4685,39 +4676,55 @@
           <a:lstStyle/>
           <a:p>
             <a:r>
-              <a:rPr lang="en-US" dirty="0" smtClean="0"/>
-              <a:t>Take the above to concepts and put them together</a:t>
-            </a:r>
-          </a:p>
-          <a:p>
-            <a:r>
               <a:rPr lang="en-US" dirty="0" err="1" smtClean="0"/>
-              <a:t>Concinella</a:t>
-            </a:r>
-            <a:r>
-              <a:rPr lang="en-US" dirty="0" smtClean="0"/>
-              <a:t> already does this</a:t>
-            </a:r>
-          </a:p>
-          <a:p>
-            <a:r>
-              <a:rPr lang="en-US" dirty="0" smtClean="0"/>
-              <a:t>What are the unique features of </a:t>
+              <a:t>Github</a:t>
+            </a:r>
+            <a:r>
+              <a:rPr lang="en-US" dirty="0" smtClean="0"/>
+              <a:t> for version control</a:t>
+            </a:r>
+          </a:p>
+          <a:p>
+            <a:r>
+              <a:rPr lang="en-US" dirty="0" smtClean="0"/>
+              <a:t>Eclipse for development</a:t>
+            </a:r>
+          </a:p>
+          <a:p>
+            <a:r>
+              <a:rPr lang="en-US" dirty="0" smtClean="0"/>
+              <a:t>UNIX server for hosting our </a:t>
             </a:r>
             <a:r>
               <a:rPr lang="en-US" dirty="0" err="1" smtClean="0"/>
-              <a:t>Chatboard</a:t>
-            </a:r>
-            <a:r>
-              <a:rPr lang="en-US" dirty="0" smtClean="0"/>
-              <a:t> then?</a:t>
-            </a:r>
-          </a:p>
-          <a:p>
-            <a:r>
-              <a:rPr lang="en-US" dirty="0" smtClean="0"/>
-              <a:t>Java based</a:t>
-            </a:r>
+              <a:t>openfire</a:t>
+            </a:r>
+            <a:endParaRPr lang="en-US" dirty="0" smtClean="0"/>
+          </a:p>
+          <a:p>
+            <a:r>
+              <a:rPr lang="en-US" dirty="0" smtClean="0"/>
+              <a:t>Ticketing and Bug fixes </a:t>
+            </a:r>
+            <a:r>
+              <a:rPr lang="en-US" dirty="0" err="1" smtClean="0"/>
+              <a:t>tbd</a:t>
+            </a:r>
+            <a:endParaRPr lang="en-US" dirty="0" smtClean="0"/>
+          </a:p>
+          <a:p>
+            <a:r>
+              <a:rPr lang="en-US" dirty="0" smtClean="0"/>
+              <a:t>No development blog/twitter at the moment</a:t>
+            </a:r>
+          </a:p>
+          <a:p>
+            <a:pPr lvl="1"/>
+            <a:r>
+              <a:rPr lang="en-US" dirty="0" smtClean="0"/>
+              <a:t>Project for Fall break</a:t>
+            </a:r>
+            <a:endParaRPr lang="en-US" dirty="0"/>
           </a:p>
         </p:txBody>
       </p:sp>
@@ -4729,8 +4736,8 @@
 </p:sld>
 </file>
 
-<file path=ppt/slides/slide4.xml><?xml version="1.0" encoding="utf-8"?>
-<p:sld xmlns:a="http://schemas.openxmlformats.org/drawingml/2006/main" xmlns:r="http://schemas.openxmlformats.org/officeDocument/2006/relationships" xmlns:mc="http://schemas.openxmlformats.org/markup-compatibility/2006" xmlns:mv="urn:schemas-microsoft-com:mac:vml" xmlns:p="http://schemas.openxmlformats.org/presentationml/2006/main" mc:Ignorable="mv" mc:PreserveAttributes="mv:*">
+<file path=ppt/slides/slide17.xml><?xml version="1.0" encoding="utf-8"?>
+<p:sld xmlns:a="http://schemas.openxmlformats.org/drawingml/2006/main" xmlns:r="http://schemas.openxmlformats.org/officeDocument/2006/relationships" xmlns:p="http://schemas.openxmlformats.org/presentationml/2006/main">
   <p:cSld>
     <p:spTree>
       <p:nvGrpSpPr>
@@ -4748,7 +4755,7 @@
       </p:grpSpPr>
       <p:sp>
         <p:nvSpPr>
-          <p:cNvPr id="2" name="Title 1"/>
+          <p:cNvPr id="4" name="Title 3"/>
           <p:cNvSpPr>
             <a:spLocks noGrp="1"/>
           </p:cNvSpPr>
@@ -4762,68 +4769,10 @@
           <a:lstStyle/>
           <a:p>
             <a:r>
-              <a:rPr lang="en-US" dirty="0" smtClean="0"/>
-              <a:t>Metaphors</a:t>
-            </a:r>
-            <a:endParaRPr lang="en-US" dirty="0"/>
-          </a:p>
-        </p:txBody>
-      </p:sp>
-      <p:sp>
-        <p:nvSpPr>
-          <p:cNvPr id="3" name="Content Placeholder 2"/>
-          <p:cNvSpPr>
-            <a:spLocks noGrp="1"/>
-          </p:cNvSpPr>
-          <p:nvPr>
-            <p:ph idx="1"/>
-          </p:nvPr>
-        </p:nvSpPr>
-        <p:spPr/>
-        <p:txBody>
-          <a:bodyPr>
-            <a:normAutofit fontScale="92500" lnSpcReduction="20000"/>
-          </a:bodyPr>
-          <a:lstStyle/>
-          <a:p>
-            <a:r>
-              <a:rPr lang="en-US" dirty="0" smtClean="0"/>
-              <a:t>IM as chatting: IM clients chatting to each other in the same protocol are like two people of the same language talking to each other through an interpreter</a:t>
-            </a:r>
-          </a:p>
-          <a:p>
-            <a:pPr lvl="1"/>
-            <a:r>
-              <a:rPr lang="en-US" dirty="0" smtClean="0"/>
-              <a:t>So extend this to multiprotocol: We want our client to be able to know more languages</a:t>
-            </a:r>
-          </a:p>
-          <a:p>
-            <a:r>
-              <a:rPr lang="en-US" dirty="0" smtClean="0"/>
-              <a:t>Whiteboard as a door greeter</a:t>
-            </a:r>
-          </a:p>
-          <a:p>
-            <a:pPr lvl="1"/>
-            <a:r>
-              <a:rPr lang="en-US" dirty="0" smtClean="0"/>
-              <a:t>A whiteboard while one is offline is capable of being drawn on by a roommate or a friend</a:t>
-            </a:r>
-          </a:p>
-          <a:p>
-            <a:r>
-              <a:rPr lang="en-US" dirty="0" smtClean="0"/>
-              <a:t>Whiteboard as a collaboration tool</a:t>
-            </a:r>
-          </a:p>
-          <a:p>
-            <a:pPr lvl="1"/>
-            <a:r>
-              <a:rPr lang="en-US" dirty="0" smtClean="0"/>
-              <a:t>The most generally used version of the whiteboard</a:t>
-            </a:r>
-            <a:endParaRPr lang="en-US" dirty="0"/>
+              <a:rPr lang="en-US" smtClean="0"/>
+              <a:t>QUESTIONS</a:t>
+            </a:r>
+            <a:endParaRPr lang="en-US"/>
           </a:p>
         </p:txBody>
       </p:sp>
@@ -4835,8 +4784,8 @@
 </p:sld>
 </file>
 
-<file path=ppt/slides/slide5.xml><?xml version="1.0" encoding="utf-8"?>
-<p:sld xmlns:a="http://schemas.openxmlformats.org/drawingml/2006/main" xmlns:r="http://schemas.openxmlformats.org/officeDocument/2006/relationships" xmlns:mc="http://schemas.openxmlformats.org/markup-compatibility/2006" xmlns:mv="urn:schemas-microsoft-com:mac:vml" xmlns:p="http://schemas.openxmlformats.org/presentationml/2006/main" mc:Ignorable="mv" mc:PreserveAttributes="mv:*">
+<file path=ppt/slides/slide2.xml><?xml version="1.0" encoding="utf-8"?>
+<p:sld xmlns:a="http://schemas.openxmlformats.org/drawingml/2006/main" xmlns:r="http://schemas.openxmlformats.org/officeDocument/2006/relationships" xmlns:p="http://schemas.openxmlformats.org/presentationml/2006/main">
   <p:cSld>
     <p:spTree>
       <p:nvGrpSpPr>
@@ -4869,7 +4818,7 @@
           <a:p>
             <a:r>
               <a:rPr lang="en-US" dirty="0" smtClean="0"/>
-              <a:t>Parts</a:t>
+              <a:t>Background</a:t>
             </a:r>
             <a:endParaRPr lang="en-US" dirty="0"/>
           </a:p>
@@ -4887,98 +4836,73 @@
         </p:nvSpPr>
         <p:spPr/>
         <p:txBody>
-          <a:bodyPr>
-            <a:normAutofit fontScale="85000" lnSpcReduction="20000"/>
-          </a:bodyPr>
-          <a:lstStyle/>
-          <a:p>
-            <a:r>
-              <a:rPr lang="en-US" dirty="0" smtClean="0"/>
-              <a:t>External libraries (model):</a:t>
+          <a:bodyPr/>
+          <a:lstStyle/>
+          <a:p>
+            <a:r>
+              <a:rPr lang="en-US" dirty="0" smtClean="0"/>
+              <a:t>Many Multiprotocol IM’s</a:t>
             </a:r>
           </a:p>
           <a:p>
             <a:pPr lvl="1"/>
             <a:r>
               <a:rPr lang="en-US" dirty="0" smtClean="0"/>
-              <a:t>Many of the ideals of multi-protocol chatting have been set for us in XMPP the Smack API</a:t>
-            </a:r>
+              <a:t>Similar to </a:t>
+            </a:r>
+            <a:r>
+              <a:rPr lang="en-US" dirty="0" err="1" smtClean="0"/>
+              <a:t>Digsby</a:t>
+            </a:r>
+            <a:endParaRPr lang="en-US" dirty="0" smtClean="0"/>
           </a:p>
           <a:p>
             <a:pPr lvl="1"/>
             <a:r>
-              <a:rPr lang="en-US" dirty="0" smtClean="0"/>
-              <a:t>Also looking at the </a:t>
-            </a:r>
-            <a:r>
               <a:rPr lang="en-US" dirty="0" err="1" smtClean="0"/>
-              <a:t>Openfire</a:t>
-            </a:r>
-            <a:r>
-              <a:rPr lang="en-US" dirty="0" smtClean="0"/>
-              <a:t> server</a:t>
-            </a:r>
-          </a:p>
-          <a:p>
-            <a:r>
-              <a:rPr lang="en-US" dirty="0" smtClean="0"/>
-              <a:t>GUI (view):</a:t>
+              <a:t>Adium</a:t>
+            </a:r>
+            <a:r>
+              <a:rPr lang="en-US" dirty="0" smtClean="0"/>
+              <a:t> for </a:t>
+            </a:r>
+            <a:r>
+              <a:rPr lang="en-US" dirty="0" err="1" smtClean="0"/>
+              <a:t>mac</a:t>
+            </a:r>
+            <a:endParaRPr lang="en-US" dirty="0" smtClean="0"/>
+          </a:p>
+          <a:p>
+            <a:r>
+              <a:rPr lang="en-US" dirty="0" smtClean="0"/>
+              <a:t>Many whiteboards</a:t>
             </a:r>
           </a:p>
           <a:p>
             <a:pPr lvl="1"/>
             <a:r>
               <a:rPr lang="en-US" dirty="0" smtClean="0"/>
-              <a:t>Windows</a:t>
+              <a:t>Microsoft live meeting</a:t>
             </a:r>
           </a:p>
           <a:p>
             <a:pPr lvl="1"/>
             <a:r>
               <a:rPr lang="en-US" dirty="0" smtClean="0"/>
-              <a:t>Preferences windows</a:t>
-            </a:r>
-          </a:p>
-          <a:p>
-            <a:r>
-              <a:rPr lang="en-US" dirty="0" smtClean="0"/>
-              <a:t>Core (controller):</a:t>
-            </a:r>
-          </a:p>
-          <a:p>
-            <a:pPr lvl="1"/>
-            <a:r>
-              <a:rPr lang="en-US" dirty="0" smtClean="0"/>
-              <a:t>IM</a:t>
-            </a:r>
-          </a:p>
-          <a:p>
-            <a:pPr lvl="1"/>
-            <a:r>
-              <a:rPr lang="en-US" dirty="0" smtClean="0"/>
-              <a:t>Network</a:t>
-            </a:r>
-          </a:p>
-          <a:p>
-            <a:pPr lvl="1"/>
-            <a:r>
-              <a:rPr lang="en-US" dirty="0" smtClean="0"/>
-              <a:t>Utility</a:t>
-            </a:r>
-          </a:p>
-          <a:p>
-            <a:pPr lvl="1"/>
-            <a:r>
-              <a:rPr lang="en-US" dirty="0" smtClean="0"/>
-              <a:t>Whiteboard</a:t>
-            </a:r>
-          </a:p>
-          <a:p>
-            <a:pPr lvl="1"/>
+              <a:t>Popular as a live action tool</a:t>
+            </a:r>
+          </a:p>
+          <a:p>
+            <a:pPr lvl="2"/>
+            <a:r>
+              <a:rPr lang="en-US" dirty="0" smtClean="0"/>
+              <a:t>Especially as students in computer science/engineering</a:t>
+            </a:r>
+          </a:p>
+          <a:p>
             <a:endParaRPr lang="en-US" dirty="0" smtClean="0"/>
           </a:p>
           <a:p>
-            <a:pPr lvl="1"/>
             <a:endParaRPr lang="en-US" dirty="0"/>
           </a:p>
         </p:txBody>
@@ -4991,8 +4915,8 @@
 </p:sld>
 </file>
 
-<file path=ppt/slides/slide6.xml><?xml version="1.0" encoding="utf-8"?>
-<p:sld xmlns:a="http://schemas.openxmlformats.org/drawingml/2006/main" xmlns:r="http://schemas.openxmlformats.org/officeDocument/2006/relationships" xmlns:mc="http://schemas.openxmlformats.org/markup-compatibility/2006" xmlns:mv="urn:schemas-microsoft-com:mac:vml" xmlns:p="http://schemas.openxmlformats.org/presentationml/2006/main" mc:Ignorable="mv" mc:PreserveAttributes="mv:*">
+<file path=ppt/slides/slide3.xml><?xml version="1.0" encoding="utf-8"?>
+<p:sld xmlns:a="http://schemas.openxmlformats.org/drawingml/2006/main" xmlns:r="http://schemas.openxmlformats.org/officeDocument/2006/relationships" xmlns:p="http://schemas.openxmlformats.org/presentationml/2006/main">
   <p:cSld>
     <p:spTree>
       <p:nvGrpSpPr>
@@ -5010,7 +4934,7 @@
       </p:grpSpPr>
       <p:sp>
         <p:nvSpPr>
-          <p:cNvPr id="4" name="Title 3"/>
+          <p:cNvPr id="2" name="Title 1"/>
           <p:cNvSpPr>
             <a:spLocks noGrp="1"/>
           </p:cNvSpPr>
@@ -5025,7 +4949,7 @@
           <a:p>
             <a:r>
               <a:rPr lang="en-US" dirty="0" smtClean="0"/>
-              <a:t>Core IM and network</a:t>
+              <a:t>Conception</a:t>
             </a:r>
             <a:endParaRPr lang="en-US" dirty="0"/>
           </a:p>
@@ -5033,24 +4957,53 @@
       </p:sp>
       <p:sp>
         <p:nvSpPr>
-          <p:cNvPr id="5" name="Text Placeholder 4"/>
-          <p:cNvSpPr>
-            <a:spLocks noGrp="1"/>
-          </p:cNvSpPr>
-          <p:nvPr>
-            <p:ph type="body" idx="1"/>
-          </p:nvPr>
-        </p:nvSpPr>
-        <p:spPr/>
-        <p:txBody>
-          <a:bodyPr/>
-          <a:lstStyle/>
-          <a:p>
-            <a:r>
-              <a:rPr lang="en-US" dirty="0" smtClean="0"/>
-              <a:t>Felix</a:t>
-            </a:r>
-            <a:endParaRPr lang="en-US" dirty="0"/>
+          <p:cNvPr id="3" name="Content Placeholder 2"/>
+          <p:cNvSpPr>
+            <a:spLocks noGrp="1"/>
+          </p:cNvSpPr>
+          <p:nvPr>
+            <p:ph idx="1"/>
+          </p:nvPr>
+        </p:nvSpPr>
+        <p:spPr/>
+        <p:txBody>
+          <a:bodyPr/>
+          <a:lstStyle/>
+          <a:p>
+            <a:r>
+              <a:rPr lang="en-US" dirty="0" smtClean="0"/>
+              <a:t>Take the above to concepts and put them together</a:t>
+            </a:r>
+          </a:p>
+          <a:p>
+            <a:r>
+              <a:rPr lang="en-US" dirty="0" err="1" smtClean="0"/>
+              <a:t>Concinella</a:t>
+            </a:r>
+            <a:r>
+              <a:rPr lang="en-US" dirty="0" smtClean="0"/>
+              <a:t> already does this</a:t>
+            </a:r>
+          </a:p>
+          <a:p>
+            <a:r>
+              <a:rPr lang="en-US" dirty="0" smtClean="0"/>
+              <a:t>What are the unique features of </a:t>
+            </a:r>
+            <a:r>
+              <a:rPr lang="en-US" dirty="0" err="1" smtClean="0"/>
+              <a:t>Chatboard</a:t>
+            </a:r>
+            <a:r>
+              <a:rPr lang="en-US" dirty="0" smtClean="0"/>
+              <a:t> then?</a:t>
+            </a:r>
+          </a:p>
+          <a:p>
+            <a:r>
+              <a:rPr lang="en-US" dirty="0" smtClean="0"/>
+              <a:t>Java based</a:t>
+            </a:r>
           </a:p>
         </p:txBody>
       </p:sp>
@@ -5062,8 +5015,8 @@
 </p:sld>
 </file>
 
-<file path=ppt/slides/slide7.xml><?xml version="1.0" encoding="utf-8"?>
-<p:sld xmlns:a="http://schemas.openxmlformats.org/drawingml/2006/main" xmlns:r="http://schemas.openxmlformats.org/officeDocument/2006/relationships" xmlns:mc="http://schemas.openxmlformats.org/markup-compatibility/2006" xmlns:mv="urn:schemas-microsoft-com:mac:vml" xmlns:p="http://schemas.openxmlformats.org/presentationml/2006/main" mc:Ignorable="mv" mc:PreserveAttributes="mv:*">
+<file path=ppt/slides/slide4.xml><?xml version="1.0" encoding="utf-8"?>
+<p:sld xmlns:a="http://schemas.openxmlformats.org/drawingml/2006/main" xmlns:r="http://schemas.openxmlformats.org/officeDocument/2006/relationships" xmlns:p="http://schemas.openxmlformats.org/presentationml/2006/main">
   <p:cSld>
     <p:spTree>
       <p:nvGrpSpPr>
@@ -5081,7 +5034,7 @@
       </p:grpSpPr>
       <p:sp>
         <p:nvSpPr>
-          <p:cNvPr id="4" name="Title 3"/>
+          <p:cNvPr id="2" name="Title 1"/>
           <p:cNvSpPr>
             <a:spLocks noGrp="1"/>
           </p:cNvSpPr>
@@ -5096,7 +5049,7 @@
           <a:p>
             <a:r>
               <a:rPr lang="en-US" dirty="0" smtClean="0"/>
-              <a:t>Main principle</a:t>
+              <a:t>Metaphors</a:t>
             </a:r>
             <a:endParaRPr lang="en-US" dirty="0"/>
           </a:p>
@@ -5104,7 +5057,7 @@
       </p:sp>
       <p:sp>
         <p:nvSpPr>
-          <p:cNvPr id="5" name="Content Placeholder 4"/>
+          <p:cNvPr id="3" name="Content Placeholder 2"/>
           <p:cNvSpPr>
             <a:spLocks noGrp="1"/>
           </p:cNvSpPr>
@@ -5114,30 +5067,47 @@
         </p:nvSpPr>
         <p:spPr/>
         <p:txBody>
-          <a:bodyPr/>
-          <a:lstStyle/>
-          <a:p>
-            <a:r>
-              <a:rPr lang="en-US" dirty="0" smtClean="0"/>
-              <a:t>Encapsulate the models further</a:t>
-            </a:r>
-          </a:p>
-          <a:p>
-            <a:r>
-              <a:rPr lang="en-US" dirty="0" smtClean="0"/>
-              <a:t>Have Justin and Jeff do as little work as necessary with the raw objects</a:t>
-            </a:r>
-          </a:p>
-          <a:p>
-            <a:r>
-              <a:rPr lang="en-US" dirty="0" smtClean="0"/>
-              <a:t>Handle exceptions</a:t>
-            </a:r>
-          </a:p>
-          <a:p>
-            <a:r>
-              <a:rPr lang="en-US" dirty="0" smtClean="0"/>
-              <a:t>Code to be able to handle connections to servers</a:t>
+          <a:bodyPr>
+            <a:normAutofit fontScale="92500" lnSpcReduction="20000"/>
+          </a:bodyPr>
+          <a:lstStyle/>
+          <a:p>
+            <a:r>
+              <a:rPr lang="en-US" dirty="0" smtClean="0"/>
+              <a:t>IM as chatting: IM clients chatting to each other in the same protocol are like two people of the same language talking to each other through an interpreter</a:t>
+            </a:r>
+          </a:p>
+          <a:p>
+            <a:pPr lvl="1"/>
+            <a:r>
+              <a:rPr lang="en-US" dirty="0" smtClean="0"/>
+              <a:t>So extend this to multiprotocol: We want our client to be able to know more languages</a:t>
+            </a:r>
+          </a:p>
+          <a:p>
+            <a:r>
+              <a:rPr lang="en-US" dirty="0" smtClean="0"/>
+              <a:t>Whiteboard as a door greeter</a:t>
+            </a:r>
+          </a:p>
+          <a:p>
+            <a:pPr lvl="1"/>
+            <a:r>
+              <a:rPr lang="en-US" dirty="0" smtClean="0"/>
+              <a:t>A whiteboard while one is offline is capable of being drawn on by a roommate or a friend</a:t>
+            </a:r>
+          </a:p>
+          <a:p>
+            <a:r>
+              <a:rPr lang="en-US" dirty="0" smtClean="0"/>
+              <a:t>Whiteboard as a collaboration tool</a:t>
+            </a:r>
+          </a:p>
+          <a:p>
+            <a:pPr lvl="1"/>
+            <a:r>
+              <a:rPr lang="en-US" dirty="0" smtClean="0"/>
+              <a:t>The most generally used version of the whiteboard</a:t>
             </a:r>
             <a:endParaRPr lang="en-US" dirty="0"/>
           </a:p>
@@ -5151,8 +5121,8 @@
 </p:sld>
 </file>
 
-<file path=ppt/slides/slide8.xml><?xml version="1.0" encoding="utf-8"?>
-<p:sld xmlns:a="http://schemas.openxmlformats.org/drawingml/2006/main" xmlns:r="http://schemas.openxmlformats.org/officeDocument/2006/relationships" xmlns:mc="http://schemas.openxmlformats.org/markup-compatibility/2006" xmlns:mv="urn:schemas-microsoft-com:mac:vml" xmlns:p="http://schemas.openxmlformats.org/presentationml/2006/main" mc:Ignorable="mv" mc:PreserveAttributes="mv:*">
+<file path=ppt/slides/slide5.xml><?xml version="1.0" encoding="utf-8"?>
+<p:sld xmlns:a="http://schemas.openxmlformats.org/drawingml/2006/main" xmlns:r="http://schemas.openxmlformats.org/officeDocument/2006/relationships" xmlns:p="http://schemas.openxmlformats.org/presentationml/2006/main">
   <p:cSld>
     <p:spTree>
       <p:nvGrpSpPr>
@@ -5185,6 +5155,322 @@
           <a:p>
             <a:r>
               <a:rPr lang="en-US" dirty="0" smtClean="0"/>
+              <a:t>Parts</a:t>
+            </a:r>
+            <a:endParaRPr lang="en-US" dirty="0"/>
+          </a:p>
+        </p:txBody>
+      </p:sp>
+      <p:sp>
+        <p:nvSpPr>
+          <p:cNvPr id="3" name="Content Placeholder 2"/>
+          <p:cNvSpPr>
+            <a:spLocks noGrp="1"/>
+          </p:cNvSpPr>
+          <p:nvPr>
+            <p:ph idx="1"/>
+          </p:nvPr>
+        </p:nvSpPr>
+        <p:spPr/>
+        <p:txBody>
+          <a:bodyPr>
+            <a:normAutofit fontScale="85000" lnSpcReduction="20000"/>
+          </a:bodyPr>
+          <a:lstStyle/>
+          <a:p>
+            <a:r>
+              <a:rPr lang="en-US" dirty="0" smtClean="0"/>
+              <a:t>External libraries (model):</a:t>
+            </a:r>
+          </a:p>
+          <a:p>
+            <a:pPr lvl="1"/>
+            <a:r>
+              <a:rPr lang="en-US" dirty="0" smtClean="0"/>
+              <a:t>Many of the ideals of multi-protocol chatting have been set for us in XMPP the Smack API</a:t>
+            </a:r>
+          </a:p>
+          <a:p>
+            <a:pPr lvl="1"/>
+            <a:r>
+              <a:rPr lang="en-US" dirty="0" smtClean="0"/>
+              <a:t>Also looking at the </a:t>
+            </a:r>
+            <a:r>
+              <a:rPr lang="en-US" dirty="0" err="1" smtClean="0"/>
+              <a:t>Openfire</a:t>
+            </a:r>
+            <a:r>
+              <a:rPr lang="en-US" dirty="0" smtClean="0"/>
+              <a:t> server</a:t>
+            </a:r>
+          </a:p>
+          <a:p>
+            <a:r>
+              <a:rPr lang="en-US" dirty="0" smtClean="0"/>
+              <a:t>GUI (view):</a:t>
+            </a:r>
+          </a:p>
+          <a:p>
+            <a:pPr lvl="1"/>
+            <a:r>
+              <a:rPr lang="en-US" dirty="0" smtClean="0"/>
+              <a:t>Windows</a:t>
+            </a:r>
+          </a:p>
+          <a:p>
+            <a:pPr lvl="1"/>
+            <a:r>
+              <a:rPr lang="en-US" dirty="0" smtClean="0"/>
+              <a:t>Preferences windows</a:t>
+            </a:r>
+          </a:p>
+          <a:p>
+            <a:r>
+              <a:rPr lang="en-US" dirty="0" smtClean="0"/>
+              <a:t>Core (controller):</a:t>
+            </a:r>
+          </a:p>
+          <a:p>
+            <a:pPr lvl="1"/>
+            <a:r>
+              <a:rPr lang="en-US" dirty="0" smtClean="0"/>
+              <a:t>IM</a:t>
+            </a:r>
+          </a:p>
+          <a:p>
+            <a:pPr lvl="1"/>
+            <a:r>
+              <a:rPr lang="en-US" dirty="0" smtClean="0"/>
+              <a:t>Network</a:t>
+            </a:r>
+          </a:p>
+          <a:p>
+            <a:pPr lvl="1"/>
+            <a:r>
+              <a:rPr lang="en-US" dirty="0" smtClean="0"/>
+              <a:t>Utility</a:t>
+            </a:r>
+          </a:p>
+          <a:p>
+            <a:pPr lvl="1"/>
+            <a:r>
+              <a:rPr lang="en-US" dirty="0" smtClean="0"/>
+              <a:t>Whiteboard</a:t>
+            </a:r>
+          </a:p>
+          <a:p>
+            <a:pPr lvl="1"/>
+            <a:endParaRPr lang="en-US" dirty="0" smtClean="0"/>
+          </a:p>
+          <a:p>
+            <a:pPr lvl="1"/>
+            <a:endParaRPr lang="en-US" dirty="0"/>
+          </a:p>
+        </p:txBody>
+      </p:sp>
+    </p:spTree>
+  </p:cSld>
+  <p:clrMapOvr>
+    <a:masterClrMapping/>
+  </p:clrMapOvr>
+</p:sld>
+</file>
+
+<file path=ppt/slides/slide6.xml><?xml version="1.0" encoding="utf-8"?>
+<p:sld xmlns:a="http://schemas.openxmlformats.org/drawingml/2006/main" xmlns:r="http://schemas.openxmlformats.org/officeDocument/2006/relationships" xmlns:p="http://schemas.openxmlformats.org/presentationml/2006/main">
+  <p:cSld>
+    <p:spTree>
+      <p:nvGrpSpPr>
+        <p:cNvPr id="1" name=""/>
+        <p:cNvGrpSpPr/>
+        <p:nvPr/>
+      </p:nvGrpSpPr>
+      <p:grpSpPr>
+        <a:xfrm>
+          <a:off x="0" y="0"/>
+          <a:ext cx="0" cy="0"/>
+          <a:chOff x="0" y="0"/>
+          <a:chExt cx="0" cy="0"/>
+        </a:xfrm>
+      </p:grpSpPr>
+      <p:sp>
+        <p:nvSpPr>
+          <p:cNvPr id="4" name="Title 3"/>
+          <p:cNvSpPr>
+            <a:spLocks noGrp="1"/>
+          </p:cNvSpPr>
+          <p:nvPr>
+            <p:ph type="title"/>
+          </p:nvPr>
+        </p:nvSpPr>
+        <p:spPr/>
+        <p:txBody>
+          <a:bodyPr/>
+          <a:lstStyle/>
+          <a:p>
+            <a:r>
+              <a:rPr lang="en-US" dirty="0" smtClean="0"/>
+              <a:t>Core IM and network</a:t>
+            </a:r>
+            <a:endParaRPr lang="en-US" dirty="0"/>
+          </a:p>
+        </p:txBody>
+      </p:sp>
+      <p:sp>
+        <p:nvSpPr>
+          <p:cNvPr id="5" name="Text Placeholder 4"/>
+          <p:cNvSpPr>
+            <a:spLocks noGrp="1"/>
+          </p:cNvSpPr>
+          <p:nvPr>
+            <p:ph type="body" idx="1"/>
+          </p:nvPr>
+        </p:nvSpPr>
+        <p:spPr/>
+        <p:txBody>
+          <a:bodyPr/>
+          <a:lstStyle/>
+          <a:p>
+            <a:r>
+              <a:rPr lang="en-US" dirty="0" smtClean="0"/>
+              <a:t>Felix</a:t>
+            </a:r>
+            <a:endParaRPr lang="en-US" dirty="0"/>
+          </a:p>
+        </p:txBody>
+      </p:sp>
+    </p:spTree>
+  </p:cSld>
+  <p:clrMapOvr>
+    <a:masterClrMapping/>
+  </p:clrMapOvr>
+</p:sld>
+</file>
+
+<file path=ppt/slides/slide7.xml><?xml version="1.0" encoding="utf-8"?>
+<p:sld xmlns:a="http://schemas.openxmlformats.org/drawingml/2006/main" xmlns:r="http://schemas.openxmlformats.org/officeDocument/2006/relationships" xmlns:p="http://schemas.openxmlformats.org/presentationml/2006/main">
+  <p:cSld>
+    <p:spTree>
+      <p:nvGrpSpPr>
+        <p:cNvPr id="1" name=""/>
+        <p:cNvGrpSpPr/>
+        <p:nvPr/>
+      </p:nvGrpSpPr>
+      <p:grpSpPr>
+        <a:xfrm>
+          <a:off x="0" y="0"/>
+          <a:ext cx="0" cy="0"/>
+          <a:chOff x="0" y="0"/>
+          <a:chExt cx="0" cy="0"/>
+        </a:xfrm>
+      </p:grpSpPr>
+      <p:sp>
+        <p:nvSpPr>
+          <p:cNvPr id="4" name="Title 3"/>
+          <p:cNvSpPr>
+            <a:spLocks noGrp="1"/>
+          </p:cNvSpPr>
+          <p:nvPr>
+            <p:ph type="title"/>
+          </p:nvPr>
+        </p:nvSpPr>
+        <p:spPr/>
+        <p:txBody>
+          <a:bodyPr/>
+          <a:lstStyle/>
+          <a:p>
+            <a:r>
+              <a:rPr lang="en-US" dirty="0" smtClean="0"/>
+              <a:t>Main principle</a:t>
+            </a:r>
+            <a:endParaRPr lang="en-US" dirty="0"/>
+          </a:p>
+        </p:txBody>
+      </p:sp>
+      <p:sp>
+        <p:nvSpPr>
+          <p:cNvPr id="5" name="Content Placeholder 4"/>
+          <p:cNvSpPr>
+            <a:spLocks noGrp="1"/>
+          </p:cNvSpPr>
+          <p:nvPr>
+            <p:ph idx="1"/>
+          </p:nvPr>
+        </p:nvSpPr>
+        <p:spPr/>
+        <p:txBody>
+          <a:bodyPr/>
+          <a:lstStyle/>
+          <a:p>
+            <a:r>
+              <a:rPr lang="en-US" dirty="0" smtClean="0"/>
+              <a:t>Encapsulate the models further</a:t>
+            </a:r>
+          </a:p>
+          <a:p>
+            <a:r>
+              <a:rPr lang="en-US" dirty="0" smtClean="0"/>
+              <a:t>Have Justin and Jeff do as little work as necessary with the raw objects</a:t>
+            </a:r>
+          </a:p>
+          <a:p>
+            <a:r>
+              <a:rPr lang="en-US" dirty="0" smtClean="0"/>
+              <a:t>Handle exceptions</a:t>
+            </a:r>
+          </a:p>
+          <a:p>
+            <a:r>
+              <a:rPr lang="en-US" dirty="0" smtClean="0"/>
+              <a:t>Code to be able to handle connections to servers</a:t>
+            </a:r>
+            <a:endParaRPr lang="en-US" dirty="0"/>
+          </a:p>
+        </p:txBody>
+      </p:sp>
+    </p:spTree>
+  </p:cSld>
+  <p:clrMapOvr>
+    <a:masterClrMapping/>
+  </p:clrMapOvr>
+</p:sld>
+</file>
+
+<file path=ppt/slides/slide8.xml><?xml version="1.0" encoding="utf-8"?>
+<p:sld xmlns:a="http://schemas.openxmlformats.org/drawingml/2006/main" xmlns:r="http://schemas.openxmlformats.org/officeDocument/2006/relationships" xmlns:p="http://schemas.openxmlformats.org/presentationml/2006/main">
+  <p:cSld>
+    <p:spTree>
+      <p:nvGrpSpPr>
+        <p:cNvPr id="1" name=""/>
+        <p:cNvGrpSpPr/>
+        <p:nvPr/>
+      </p:nvGrpSpPr>
+      <p:grpSpPr>
+        <a:xfrm>
+          <a:off x="0" y="0"/>
+          <a:ext cx="0" cy="0"/>
+          <a:chOff x="0" y="0"/>
+          <a:chExt cx="0" cy="0"/>
+        </a:xfrm>
+      </p:grpSpPr>
+      <p:sp>
+        <p:nvSpPr>
+          <p:cNvPr id="2" name="Title 1"/>
+          <p:cNvSpPr>
+            <a:spLocks noGrp="1"/>
+          </p:cNvSpPr>
+          <p:nvPr>
+            <p:ph type="title"/>
+          </p:nvPr>
+        </p:nvSpPr>
+        <p:spPr/>
+        <p:txBody>
+          <a:bodyPr/>
+          <a:lstStyle/>
+          <a:p>
+            <a:r>
+              <a:rPr lang="en-US" dirty="0" smtClean="0"/>
               <a:t>Using the Smack API’s</a:t>
             </a:r>
             <a:endParaRPr lang="en-US" dirty="0"/>
@@ -5249,7 +5535,7 @@
 </file>
 
 <file path=ppt/slides/slide9.xml><?xml version="1.0" encoding="utf-8"?>
-<p:sld xmlns:a="http://schemas.openxmlformats.org/drawingml/2006/main" xmlns:r="http://schemas.openxmlformats.org/officeDocument/2006/relationships" xmlns:mc="http://schemas.openxmlformats.org/markup-compatibility/2006" xmlns:mv="urn:schemas-microsoft-com:mac:vml" xmlns:p="http://schemas.openxmlformats.org/presentationml/2006/main" mc:Ignorable="mv" mc:PreserveAttributes="mv:*">
+<p:sld xmlns:a="http://schemas.openxmlformats.org/drawingml/2006/main" xmlns:r="http://schemas.openxmlformats.org/officeDocument/2006/relationships" xmlns:p="http://schemas.openxmlformats.org/presentationml/2006/main">
   <p:cSld>
     <p:spTree>
       <p:nvGrpSpPr>

</xml_diff>